<commit_message>
1. AD inserted in AoT main 2. new_architecture finally done 3. welcome permission image added (4 -> 5) 4. ppt changed (message table fixed)
</commit_message>
<xml_diff>
--- a/Carrot AND Stick.pptx
+++ b/Carrot AND Stick.pptx
@@ -260,7 +260,7 @@
           <a:p>
             <a:fld id="{8B9F15C9-92B9-4E75-9419-66BA160F044F}" type="datetimeFigureOut">
               <a:rPr lang="ko-KR" altLang="en-US" smtClean="0"/>
-              <a:t>2016-12-18</a:t>
+              <a:t>2016-12-28</a:t>
             </a:fld>
             <a:endParaRPr lang="ko-KR" altLang="en-US"/>
           </a:p>
@@ -428,7 +428,7 @@
           <a:p>
             <a:fld id="{8B9F15C9-92B9-4E75-9419-66BA160F044F}" type="datetimeFigureOut">
               <a:rPr lang="ko-KR" altLang="en-US" smtClean="0"/>
-              <a:t>2016-12-18</a:t>
+              <a:t>2016-12-28</a:t>
             </a:fld>
             <a:endParaRPr lang="ko-KR" altLang="en-US"/>
           </a:p>
@@ -606,7 +606,7 @@
           <a:p>
             <a:fld id="{8B9F15C9-92B9-4E75-9419-66BA160F044F}" type="datetimeFigureOut">
               <a:rPr lang="ko-KR" altLang="en-US" smtClean="0"/>
-              <a:t>2016-12-18</a:t>
+              <a:t>2016-12-28</a:t>
             </a:fld>
             <a:endParaRPr lang="ko-KR" altLang="en-US"/>
           </a:p>
@@ -774,7 +774,7 @@
           <a:p>
             <a:fld id="{8B9F15C9-92B9-4E75-9419-66BA160F044F}" type="datetimeFigureOut">
               <a:rPr lang="ko-KR" altLang="en-US" smtClean="0"/>
-              <a:t>2016-12-18</a:t>
+              <a:t>2016-12-28</a:t>
             </a:fld>
             <a:endParaRPr lang="ko-KR" altLang="en-US"/>
           </a:p>
@@ -1019,7 +1019,7 @@
           <a:p>
             <a:fld id="{8B9F15C9-92B9-4E75-9419-66BA160F044F}" type="datetimeFigureOut">
               <a:rPr lang="ko-KR" altLang="en-US" smtClean="0"/>
-              <a:t>2016-12-18</a:t>
+              <a:t>2016-12-28</a:t>
             </a:fld>
             <a:endParaRPr lang="ko-KR" altLang="en-US"/>
           </a:p>
@@ -1248,7 +1248,7 @@
           <a:p>
             <a:fld id="{8B9F15C9-92B9-4E75-9419-66BA160F044F}" type="datetimeFigureOut">
               <a:rPr lang="ko-KR" altLang="en-US" smtClean="0"/>
-              <a:t>2016-12-18</a:t>
+              <a:t>2016-12-28</a:t>
             </a:fld>
             <a:endParaRPr lang="ko-KR" altLang="en-US"/>
           </a:p>
@@ -1612,7 +1612,7 @@
           <a:p>
             <a:fld id="{8B9F15C9-92B9-4E75-9419-66BA160F044F}" type="datetimeFigureOut">
               <a:rPr lang="ko-KR" altLang="en-US" smtClean="0"/>
-              <a:t>2016-12-18</a:t>
+              <a:t>2016-12-28</a:t>
             </a:fld>
             <a:endParaRPr lang="ko-KR" altLang="en-US"/>
           </a:p>
@@ -1729,7 +1729,7 @@
           <a:p>
             <a:fld id="{8B9F15C9-92B9-4E75-9419-66BA160F044F}" type="datetimeFigureOut">
               <a:rPr lang="ko-KR" altLang="en-US" smtClean="0"/>
-              <a:t>2016-12-18</a:t>
+              <a:t>2016-12-28</a:t>
             </a:fld>
             <a:endParaRPr lang="ko-KR" altLang="en-US"/>
           </a:p>
@@ -1824,7 +1824,7 @@
           <a:p>
             <a:fld id="{8B9F15C9-92B9-4E75-9419-66BA160F044F}" type="datetimeFigureOut">
               <a:rPr lang="ko-KR" altLang="en-US" smtClean="0"/>
-              <a:t>2016-12-18</a:t>
+              <a:t>2016-12-28</a:t>
             </a:fld>
             <a:endParaRPr lang="ko-KR" altLang="en-US"/>
           </a:p>
@@ -2099,7 +2099,7 @@
           <a:p>
             <a:fld id="{8B9F15C9-92B9-4E75-9419-66BA160F044F}" type="datetimeFigureOut">
               <a:rPr lang="ko-KR" altLang="en-US" smtClean="0"/>
-              <a:t>2016-12-18</a:t>
+              <a:t>2016-12-28</a:t>
             </a:fld>
             <a:endParaRPr lang="ko-KR" altLang="en-US"/>
           </a:p>
@@ -2351,7 +2351,7 @@
           <a:p>
             <a:fld id="{8B9F15C9-92B9-4E75-9419-66BA160F044F}" type="datetimeFigureOut">
               <a:rPr lang="ko-KR" altLang="en-US" smtClean="0"/>
-              <a:t>2016-12-18</a:t>
+              <a:t>2016-12-28</a:t>
             </a:fld>
             <a:endParaRPr lang="ko-KR" altLang="en-US"/>
           </a:p>
@@ -2562,7 +2562,7 @@
           <a:p>
             <a:fld id="{8B9F15C9-92B9-4E75-9419-66BA160F044F}" type="datetimeFigureOut">
               <a:rPr lang="ko-KR" altLang="en-US" smtClean="0"/>
-              <a:t>2016-12-18</a:t>
+              <a:t>2016-12-28</a:t>
             </a:fld>
             <a:endParaRPr lang="ko-KR" altLang="en-US"/>
           </a:p>
@@ -37528,14 +37528,7 @@
                   <a:latin typeface="나눔고딕" pitchFamily="50" charset="-127"/>
                   <a:ea typeface="나눔고딕" pitchFamily="50" charset="-127"/>
                 </a:rPr>
-                <a:t>) request </a:t>
-              </a:r>
-              <a:r>
-                <a:rPr lang="en-US" altLang="ko-KR" sz="1000" b="1" spc="-20" dirty="0">
-                  <a:latin typeface="나눔고딕" pitchFamily="50" charset="-127"/>
-                  <a:ea typeface="나눔고딕" pitchFamily="50" charset="-127"/>
-                </a:rPr>
-                <a:t>disconnect</a:t>
+                <a:t>) request disconnect</a:t>
               </a:r>
               <a:endParaRPr lang="en-US" altLang="ko-KR" sz="1000" spc="-20" dirty="0">
                 <a:latin typeface="나눔고딕" pitchFamily="50" charset="-127"/>
@@ -37915,6 +37908,629 @@
             </a:p>
           </p:txBody>
         </p:sp>
+      </p:grpSp>
+      <p:sp>
+        <p:nvSpPr>
+          <p:cNvPr id="121" name="TextBox 52"/>
+          <p:cNvSpPr txBox="1"/>
+          <p:nvPr/>
+        </p:nvSpPr>
+        <p:spPr>
+          <a:xfrm>
+            <a:off x="10394291" y="0"/>
+            <a:ext cx="1789172" cy="523220"/>
+          </a:xfrm>
+          <a:prstGeom prst="rect">
+            <a:avLst/>
+          </a:prstGeom>
+          <a:noFill/>
+        </p:spPr>
+        <p:txBody>
+          <a:bodyPr wrap="square" rtlCol="0">
+            <a:spAutoFit/>
+          </a:bodyPr>
+          <a:lstStyle>
+            <a:defPPr>
+              <a:defRPr lang="ko-KR"/>
+            </a:defPPr>
+            <a:lvl1pPr marL="0" algn="l" defTabSz="914400" rtl="0" eaLnBrk="1" latinLnBrk="1" hangingPunct="1">
+              <a:defRPr sz="1800" kern="1200">
+                <a:solidFill>
+                  <a:schemeClr val="tx1"/>
+                </a:solidFill>
+                <a:latin typeface="+mn-lt"/>
+                <a:ea typeface="+mn-ea"/>
+                <a:cs typeface="+mn-cs"/>
+              </a:defRPr>
+            </a:lvl1pPr>
+            <a:lvl2pPr marL="457200" algn="l" defTabSz="914400" rtl="0" eaLnBrk="1" latinLnBrk="1" hangingPunct="1">
+              <a:defRPr sz="1800" kern="1200">
+                <a:solidFill>
+                  <a:schemeClr val="tx1"/>
+                </a:solidFill>
+                <a:latin typeface="+mn-lt"/>
+                <a:ea typeface="+mn-ea"/>
+                <a:cs typeface="+mn-cs"/>
+              </a:defRPr>
+            </a:lvl2pPr>
+            <a:lvl3pPr marL="914400" algn="l" defTabSz="914400" rtl="0" eaLnBrk="1" latinLnBrk="1" hangingPunct="1">
+              <a:defRPr sz="1800" kern="1200">
+                <a:solidFill>
+                  <a:schemeClr val="tx1"/>
+                </a:solidFill>
+                <a:latin typeface="+mn-lt"/>
+                <a:ea typeface="+mn-ea"/>
+                <a:cs typeface="+mn-cs"/>
+              </a:defRPr>
+            </a:lvl3pPr>
+            <a:lvl4pPr marL="1371600" algn="l" defTabSz="914400" rtl="0" eaLnBrk="1" latinLnBrk="1" hangingPunct="1">
+              <a:defRPr sz="1800" kern="1200">
+                <a:solidFill>
+                  <a:schemeClr val="tx1"/>
+                </a:solidFill>
+                <a:latin typeface="+mn-lt"/>
+                <a:ea typeface="+mn-ea"/>
+                <a:cs typeface="+mn-cs"/>
+              </a:defRPr>
+            </a:lvl4pPr>
+            <a:lvl5pPr marL="1828800" algn="l" defTabSz="914400" rtl="0" eaLnBrk="1" latinLnBrk="1" hangingPunct="1">
+              <a:defRPr sz="1800" kern="1200">
+                <a:solidFill>
+                  <a:schemeClr val="tx1"/>
+                </a:solidFill>
+                <a:latin typeface="+mn-lt"/>
+                <a:ea typeface="+mn-ea"/>
+                <a:cs typeface="+mn-cs"/>
+              </a:defRPr>
+            </a:lvl5pPr>
+            <a:lvl6pPr marL="2286000" algn="l" defTabSz="914400" rtl="0" eaLnBrk="1" latinLnBrk="1" hangingPunct="1">
+              <a:defRPr sz="1800" kern="1200">
+                <a:solidFill>
+                  <a:schemeClr val="tx1"/>
+                </a:solidFill>
+                <a:latin typeface="+mn-lt"/>
+                <a:ea typeface="+mn-ea"/>
+                <a:cs typeface="+mn-cs"/>
+              </a:defRPr>
+            </a:lvl6pPr>
+            <a:lvl7pPr marL="2743200" algn="l" defTabSz="914400" rtl="0" eaLnBrk="1" latinLnBrk="1" hangingPunct="1">
+              <a:defRPr sz="1800" kern="1200">
+                <a:solidFill>
+                  <a:schemeClr val="tx1"/>
+                </a:solidFill>
+                <a:latin typeface="+mn-lt"/>
+                <a:ea typeface="+mn-ea"/>
+                <a:cs typeface="+mn-cs"/>
+              </a:defRPr>
+            </a:lvl7pPr>
+            <a:lvl8pPr marL="3200400" algn="l" defTabSz="914400" rtl="0" eaLnBrk="1" latinLnBrk="1" hangingPunct="1">
+              <a:defRPr sz="1800" kern="1200">
+                <a:solidFill>
+                  <a:schemeClr val="tx1"/>
+                </a:solidFill>
+                <a:latin typeface="+mn-lt"/>
+                <a:ea typeface="+mn-ea"/>
+                <a:cs typeface="+mn-cs"/>
+              </a:defRPr>
+            </a:lvl8pPr>
+            <a:lvl9pPr marL="3657600" algn="l" defTabSz="914400" rtl="0" eaLnBrk="1" latinLnBrk="1" hangingPunct="1">
+              <a:defRPr sz="1800" kern="1200">
+                <a:solidFill>
+                  <a:schemeClr val="tx1"/>
+                </a:solidFill>
+                <a:latin typeface="+mn-lt"/>
+                <a:ea typeface="+mn-ea"/>
+                <a:cs typeface="+mn-cs"/>
+              </a:defRPr>
+            </a:lvl9pPr>
+          </a:lstStyle>
+          <a:p>
+            <a:pPr marL="177800" indent="-177800" algn="r"/>
+            <a:r>
+              <a:rPr lang="en-US" altLang="ko-KR" sz="2800" b="1" spc="-20" dirty="0">
+                <a:solidFill>
+                  <a:schemeClr val="tx1">
+                    <a:lumMod val="65000"/>
+                    <a:lumOff val="35000"/>
+                  </a:schemeClr>
+                </a:solidFill>
+                <a:latin typeface="나눔고딕" pitchFamily="50" charset="-127"/>
+                <a:ea typeface="나눔고딕" pitchFamily="50" charset="-127"/>
+              </a:rPr>
+              <a:t>v.161228</a:t>
+            </a:r>
+            <a:endParaRPr lang="en-US" altLang="ko-KR" sz="2800" spc="-20" dirty="0">
+              <a:solidFill>
+                <a:schemeClr val="tx1">
+                  <a:lumMod val="65000"/>
+                  <a:lumOff val="35000"/>
+                </a:schemeClr>
+              </a:solidFill>
+              <a:latin typeface="나눔고딕" pitchFamily="50" charset="-127"/>
+              <a:ea typeface="나눔고딕" pitchFamily="50" charset="-127"/>
+            </a:endParaRPr>
+          </a:p>
+        </p:txBody>
+      </p:sp>
+      <p:grpSp>
+        <p:nvGrpSpPr>
+          <p:cNvPr id="122" name="그룹 121"/>
+          <p:cNvGrpSpPr/>
+          <p:nvPr/>
+        </p:nvGrpSpPr>
+        <p:grpSpPr>
+          <a:xfrm>
+            <a:off x="6096000" y="4306746"/>
+            <a:ext cx="2000024" cy="246221"/>
+            <a:chOff x="6096000" y="3747405"/>
+            <a:chExt cx="2000024" cy="246221"/>
+          </a:xfrm>
+        </p:grpSpPr>
+        <p:sp>
+          <p:nvSpPr>
+            <p:cNvPr id="123" name="TextBox 43"/>
+            <p:cNvSpPr txBox="1"/>
+            <p:nvPr/>
+          </p:nvSpPr>
+          <p:spPr>
+            <a:xfrm>
+              <a:off x="7670601" y="3747405"/>
+              <a:ext cx="425423" cy="246221"/>
+            </a:xfrm>
+            <a:prstGeom prst="rect">
+              <a:avLst/>
+            </a:prstGeom>
+            <a:solidFill>
+              <a:schemeClr val="bg2">
+                <a:lumMod val="10000"/>
+                <a:alpha val="36078"/>
+              </a:schemeClr>
+            </a:solidFill>
+          </p:spPr>
+          <p:txBody>
+            <a:bodyPr wrap="square" rtlCol="0">
+              <a:spAutoFit/>
+            </a:bodyPr>
+            <a:lstStyle>
+              <a:defPPr>
+                <a:defRPr lang="ko-KR"/>
+              </a:defPPr>
+              <a:lvl1pPr marL="0" algn="l" defTabSz="914400" rtl="0" eaLnBrk="1" latinLnBrk="1" hangingPunct="1">
+                <a:defRPr sz="1800" kern="1200">
+                  <a:solidFill>
+                    <a:schemeClr val="tx1"/>
+                  </a:solidFill>
+                  <a:latin typeface="+mn-lt"/>
+                  <a:ea typeface="+mn-ea"/>
+                  <a:cs typeface="+mn-cs"/>
+                </a:defRPr>
+              </a:lvl1pPr>
+              <a:lvl2pPr marL="457200" algn="l" defTabSz="914400" rtl="0" eaLnBrk="1" latinLnBrk="1" hangingPunct="1">
+                <a:defRPr sz="1800" kern="1200">
+                  <a:solidFill>
+                    <a:schemeClr val="tx1"/>
+                  </a:solidFill>
+                  <a:latin typeface="+mn-lt"/>
+                  <a:ea typeface="+mn-ea"/>
+                  <a:cs typeface="+mn-cs"/>
+                </a:defRPr>
+              </a:lvl2pPr>
+              <a:lvl3pPr marL="914400" algn="l" defTabSz="914400" rtl="0" eaLnBrk="1" latinLnBrk="1" hangingPunct="1">
+                <a:defRPr sz="1800" kern="1200">
+                  <a:solidFill>
+                    <a:schemeClr val="tx1"/>
+                  </a:solidFill>
+                  <a:latin typeface="+mn-lt"/>
+                  <a:ea typeface="+mn-ea"/>
+                  <a:cs typeface="+mn-cs"/>
+                </a:defRPr>
+              </a:lvl3pPr>
+              <a:lvl4pPr marL="1371600" algn="l" defTabSz="914400" rtl="0" eaLnBrk="1" latinLnBrk="1" hangingPunct="1">
+                <a:defRPr sz="1800" kern="1200">
+                  <a:solidFill>
+                    <a:schemeClr val="tx1"/>
+                  </a:solidFill>
+                  <a:latin typeface="+mn-lt"/>
+                  <a:ea typeface="+mn-ea"/>
+                  <a:cs typeface="+mn-cs"/>
+                </a:defRPr>
+              </a:lvl4pPr>
+              <a:lvl5pPr marL="1828800" algn="l" defTabSz="914400" rtl="0" eaLnBrk="1" latinLnBrk="1" hangingPunct="1">
+                <a:defRPr sz="1800" kern="1200">
+                  <a:solidFill>
+                    <a:schemeClr val="tx1"/>
+                  </a:solidFill>
+                  <a:latin typeface="+mn-lt"/>
+                  <a:ea typeface="+mn-ea"/>
+                  <a:cs typeface="+mn-cs"/>
+                </a:defRPr>
+              </a:lvl5pPr>
+              <a:lvl6pPr marL="2286000" algn="l" defTabSz="914400" rtl="0" eaLnBrk="1" latinLnBrk="1" hangingPunct="1">
+                <a:defRPr sz="1800" kern="1200">
+                  <a:solidFill>
+                    <a:schemeClr val="tx1"/>
+                  </a:solidFill>
+                  <a:latin typeface="+mn-lt"/>
+                  <a:ea typeface="+mn-ea"/>
+                  <a:cs typeface="+mn-cs"/>
+                </a:defRPr>
+              </a:lvl6pPr>
+              <a:lvl7pPr marL="2743200" algn="l" defTabSz="914400" rtl="0" eaLnBrk="1" latinLnBrk="1" hangingPunct="1">
+                <a:defRPr sz="1800" kern="1200">
+                  <a:solidFill>
+                    <a:schemeClr val="tx1"/>
+                  </a:solidFill>
+                  <a:latin typeface="+mn-lt"/>
+                  <a:ea typeface="+mn-ea"/>
+                  <a:cs typeface="+mn-cs"/>
+                </a:defRPr>
+              </a:lvl7pPr>
+              <a:lvl8pPr marL="3200400" algn="l" defTabSz="914400" rtl="0" eaLnBrk="1" latinLnBrk="1" hangingPunct="1">
+                <a:defRPr sz="1800" kern="1200">
+                  <a:solidFill>
+                    <a:schemeClr val="tx1"/>
+                  </a:solidFill>
+                  <a:latin typeface="+mn-lt"/>
+                  <a:ea typeface="+mn-ea"/>
+                  <a:cs typeface="+mn-cs"/>
+                </a:defRPr>
+              </a:lvl8pPr>
+              <a:lvl9pPr marL="3657600" algn="l" defTabSz="914400" rtl="0" eaLnBrk="1" latinLnBrk="1" hangingPunct="1">
+                <a:defRPr sz="1800" kern="1200">
+                  <a:solidFill>
+                    <a:schemeClr val="tx1"/>
+                  </a:solidFill>
+                  <a:latin typeface="+mn-lt"/>
+                  <a:ea typeface="+mn-ea"/>
+                  <a:cs typeface="+mn-cs"/>
+                </a:defRPr>
+              </a:lvl9pPr>
+            </a:lstStyle>
+            <a:p>
+              <a:pPr marL="177800" indent="-177800" algn="ctr"/>
+              <a:r>
+                <a:rPr lang="en-US" altLang="ko-KR" sz="1000" b="1">
+                  <a:latin typeface="나눔고딕" pitchFamily="50" charset="-127"/>
+                  <a:ea typeface="나눔고딕" pitchFamily="50" charset="-127"/>
+                </a:rPr>
+                <a:t>502</a:t>
+              </a:r>
+              <a:endParaRPr lang="en-US" altLang="ko-KR" sz="1000" dirty="0">
+                <a:latin typeface="나눔고딕" pitchFamily="50" charset="-127"/>
+                <a:ea typeface="나눔고딕" pitchFamily="50" charset="-127"/>
+              </a:endParaRPr>
+            </a:p>
+          </p:txBody>
+        </p:sp>
+        <p:sp>
+          <p:nvSpPr>
+            <p:cNvPr id="124" name="TextBox 52"/>
+            <p:cNvSpPr txBox="1"/>
+            <p:nvPr/>
+          </p:nvSpPr>
+          <p:spPr>
+            <a:xfrm>
+              <a:off x="6096000" y="3777485"/>
+              <a:ext cx="1574601" cy="215444"/>
+            </a:xfrm>
+            <a:prstGeom prst="rect">
+              <a:avLst/>
+            </a:prstGeom>
+            <a:noFill/>
+          </p:spPr>
+          <p:txBody>
+            <a:bodyPr wrap="square" rtlCol="0" anchor="b">
+              <a:spAutoFit/>
+            </a:bodyPr>
+            <a:lstStyle>
+              <a:defPPr>
+                <a:defRPr lang="ko-KR"/>
+              </a:defPPr>
+              <a:lvl1pPr marL="0" algn="l" defTabSz="914400" rtl="0" eaLnBrk="1" latinLnBrk="1" hangingPunct="1">
+                <a:defRPr sz="1800" kern="1200">
+                  <a:solidFill>
+                    <a:schemeClr val="tx1"/>
+                  </a:solidFill>
+                  <a:latin typeface="+mn-lt"/>
+                  <a:ea typeface="+mn-ea"/>
+                  <a:cs typeface="+mn-cs"/>
+                </a:defRPr>
+              </a:lvl1pPr>
+              <a:lvl2pPr marL="457200" algn="l" defTabSz="914400" rtl="0" eaLnBrk="1" latinLnBrk="1" hangingPunct="1">
+                <a:defRPr sz="1800" kern="1200">
+                  <a:solidFill>
+                    <a:schemeClr val="tx1"/>
+                  </a:solidFill>
+                  <a:latin typeface="+mn-lt"/>
+                  <a:ea typeface="+mn-ea"/>
+                  <a:cs typeface="+mn-cs"/>
+                </a:defRPr>
+              </a:lvl2pPr>
+              <a:lvl3pPr marL="914400" algn="l" defTabSz="914400" rtl="0" eaLnBrk="1" latinLnBrk="1" hangingPunct="1">
+                <a:defRPr sz="1800" kern="1200">
+                  <a:solidFill>
+                    <a:schemeClr val="tx1"/>
+                  </a:solidFill>
+                  <a:latin typeface="+mn-lt"/>
+                  <a:ea typeface="+mn-ea"/>
+                  <a:cs typeface="+mn-cs"/>
+                </a:defRPr>
+              </a:lvl3pPr>
+              <a:lvl4pPr marL="1371600" algn="l" defTabSz="914400" rtl="0" eaLnBrk="1" latinLnBrk="1" hangingPunct="1">
+                <a:defRPr sz="1800" kern="1200">
+                  <a:solidFill>
+                    <a:schemeClr val="tx1"/>
+                  </a:solidFill>
+                  <a:latin typeface="+mn-lt"/>
+                  <a:ea typeface="+mn-ea"/>
+                  <a:cs typeface="+mn-cs"/>
+                </a:defRPr>
+              </a:lvl4pPr>
+              <a:lvl5pPr marL="1828800" algn="l" defTabSz="914400" rtl="0" eaLnBrk="1" latinLnBrk="1" hangingPunct="1">
+                <a:defRPr sz="1800" kern="1200">
+                  <a:solidFill>
+                    <a:schemeClr val="tx1"/>
+                  </a:solidFill>
+                  <a:latin typeface="+mn-lt"/>
+                  <a:ea typeface="+mn-ea"/>
+                  <a:cs typeface="+mn-cs"/>
+                </a:defRPr>
+              </a:lvl5pPr>
+              <a:lvl6pPr marL="2286000" algn="l" defTabSz="914400" rtl="0" eaLnBrk="1" latinLnBrk="1" hangingPunct="1">
+                <a:defRPr sz="1800" kern="1200">
+                  <a:solidFill>
+                    <a:schemeClr val="tx1"/>
+                  </a:solidFill>
+                  <a:latin typeface="+mn-lt"/>
+                  <a:ea typeface="+mn-ea"/>
+                  <a:cs typeface="+mn-cs"/>
+                </a:defRPr>
+              </a:lvl6pPr>
+              <a:lvl7pPr marL="2743200" algn="l" defTabSz="914400" rtl="0" eaLnBrk="1" latinLnBrk="1" hangingPunct="1">
+                <a:defRPr sz="1800" kern="1200">
+                  <a:solidFill>
+                    <a:schemeClr val="tx1"/>
+                  </a:solidFill>
+                  <a:latin typeface="+mn-lt"/>
+                  <a:ea typeface="+mn-ea"/>
+                  <a:cs typeface="+mn-cs"/>
+                </a:defRPr>
+              </a:lvl7pPr>
+              <a:lvl8pPr marL="3200400" algn="l" defTabSz="914400" rtl="0" eaLnBrk="1" latinLnBrk="1" hangingPunct="1">
+                <a:defRPr sz="1800" kern="1200">
+                  <a:solidFill>
+                    <a:schemeClr val="tx1"/>
+                  </a:solidFill>
+                  <a:latin typeface="+mn-lt"/>
+                  <a:ea typeface="+mn-ea"/>
+                  <a:cs typeface="+mn-cs"/>
+                </a:defRPr>
+              </a:lvl8pPr>
+              <a:lvl9pPr marL="3657600" algn="l" defTabSz="914400" rtl="0" eaLnBrk="1" latinLnBrk="1" hangingPunct="1">
+                <a:defRPr sz="1800" kern="1200">
+                  <a:solidFill>
+                    <a:schemeClr val="tx1"/>
+                  </a:solidFill>
+                  <a:latin typeface="+mn-lt"/>
+                  <a:ea typeface="+mn-ea"/>
+                  <a:cs typeface="+mn-cs"/>
+                </a:defRPr>
+              </a:lvl9pPr>
+            </a:lstStyle>
+            <a:p>
+              <a:pPr marL="177800" indent="-177800" algn="r">
+                <a:lnSpc>
+                  <a:spcPct val="80000"/>
+                </a:lnSpc>
+              </a:pPr>
+              <a:r>
+                <a:rPr lang="en-US" altLang="ko-KR" sz="1000" b="1" spc="-20" dirty="0">
+                  <a:latin typeface="나눔고딕" pitchFamily="50" charset="-127"/>
+                  <a:ea typeface="나눔고딕" pitchFamily="50" charset="-127"/>
+                </a:rPr>
+                <a:t>send CREDIT</a:t>
+              </a:r>
+              <a:endParaRPr lang="en-US" altLang="ko-KR" sz="1000" spc="-20" dirty="0">
+                <a:latin typeface="나눔고딕" pitchFamily="50" charset="-127"/>
+                <a:ea typeface="나눔고딕" pitchFamily="50" charset="-127"/>
+              </a:endParaRPr>
+            </a:p>
+          </p:txBody>
+        </p:sp>
+      </p:grpSp>
+      <p:grpSp>
+        <p:nvGrpSpPr>
+          <p:cNvPr id="128" name="그룹 127"/>
+          <p:cNvGrpSpPr/>
+          <p:nvPr/>
+        </p:nvGrpSpPr>
+        <p:grpSpPr>
+          <a:xfrm flipH="1">
+            <a:off x="8171395" y="4334445"/>
+            <a:ext cx="1255351" cy="215444"/>
+            <a:chOff x="8170557" y="5397868"/>
+            <a:chExt cx="1251378" cy="215444"/>
+          </a:xfrm>
+        </p:grpSpPr>
+        <p:sp>
+          <p:nvSpPr>
+            <p:cNvPr id="129" name="TextBox 52"/>
+            <p:cNvSpPr txBox="1"/>
+            <p:nvPr/>
+          </p:nvSpPr>
+          <p:spPr>
+            <a:xfrm>
+              <a:off x="8232898" y="5397868"/>
+              <a:ext cx="1110028" cy="215444"/>
+            </a:xfrm>
+            <a:prstGeom prst="rect">
+              <a:avLst/>
+            </a:prstGeom>
+            <a:noFill/>
+          </p:spPr>
+          <p:txBody>
+            <a:bodyPr wrap="square" rtlCol="0">
+              <a:spAutoFit/>
+            </a:bodyPr>
+            <a:lstStyle>
+              <a:defPPr>
+                <a:defRPr lang="ko-KR"/>
+              </a:defPPr>
+              <a:lvl1pPr marL="0" algn="l" defTabSz="914400" rtl="0" eaLnBrk="1" latinLnBrk="1" hangingPunct="1">
+                <a:defRPr sz="1800" kern="1200">
+                  <a:solidFill>
+                    <a:schemeClr val="tx1"/>
+                  </a:solidFill>
+                  <a:latin typeface="+mn-lt"/>
+                  <a:ea typeface="+mn-ea"/>
+                  <a:cs typeface="+mn-cs"/>
+                </a:defRPr>
+              </a:lvl1pPr>
+              <a:lvl2pPr marL="457200" algn="l" defTabSz="914400" rtl="0" eaLnBrk="1" latinLnBrk="1" hangingPunct="1">
+                <a:defRPr sz="1800" kern="1200">
+                  <a:solidFill>
+                    <a:schemeClr val="tx1"/>
+                  </a:solidFill>
+                  <a:latin typeface="+mn-lt"/>
+                  <a:ea typeface="+mn-ea"/>
+                  <a:cs typeface="+mn-cs"/>
+                </a:defRPr>
+              </a:lvl2pPr>
+              <a:lvl3pPr marL="914400" algn="l" defTabSz="914400" rtl="0" eaLnBrk="1" latinLnBrk="1" hangingPunct="1">
+                <a:defRPr sz="1800" kern="1200">
+                  <a:solidFill>
+                    <a:schemeClr val="tx1"/>
+                  </a:solidFill>
+                  <a:latin typeface="+mn-lt"/>
+                  <a:ea typeface="+mn-ea"/>
+                  <a:cs typeface="+mn-cs"/>
+                </a:defRPr>
+              </a:lvl3pPr>
+              <a:lvl4pPr marL="1371600" algn="l" defTabSz="914400" rtl="0" eaLnBrk="1" latinLnBrk="1" hangingPunct="1">
+                <a:defRPr sz="1800" kern="1200">
+                  <a:solidFill>
+                    <a:schemeClr val="tx1"/>
+                  </a:solidFill>
+                  <a:latin typeface="+mn-lt"/>
+                  <a:ea typeface="+mn-ea"/>
+                  <a:cs typeface="+mn-cs"/>
+                </a:defRPr>
+              </a:lvl4pPr>
+              <a:lvl5pPr marL="1828800" algn="l" defTabSz="914400" rtl="0" eaLnBrk="1" latinLnBrk="1" hangingPunct="1">
+                <a:defRPr sz="1800" kern="1200">
+                  <a:solidFill>
+                    <a:schemeClr val="tx1"/>
+                  </a:solidFill>
+                  <a:latin typeface="+mn-lt"/>
+                  <a:ea typeface="+mn-ea"/>
+                  <a:cs typeface="+mn-cs"/>
+                </a:defRPr>
+              </a:lvl5pPr>
+              <a:lvl6pPr marL="2286000" algn="l" defTabSz="914400" rtl="0" eaLnBrk="1" latinLnBrk="1" hangingPunct="1">
+                <a:defRPr sz="1800" kern="1200">
+                  <a:solidFill>
+                    <a:schemeClr val="tx1"/>
+                  </a:solidFill>
+                  <a:latin typeface="+mn-lt"/>
+                  <a:ea typeface="+mn-ea"/>
+                  <a:cs typeface="+mn-cs"/>
+                </a:defRPr>
+              </a:lvl6pPr>
+              <a:lvl7pPr marL="2743200" algn="l" defTabSz="914400" rtl="0" eaLnBrk="1" latinLnBrk="1" hangingPunct="1">
+                <a:defRPr sz="1800" kern="1200">
+                  <a:solidFill>
+                    <a:schemeClr val="tx1"/>
+                  </a:solidFill>
+                  <a:latin typeface="+mn-lt"/>
+                  <a:ea typeface="+mn-ea"/>
+                  <a:cs typeface="+mn-cs"/>
+                </a:defRPr>
+              </a:lvl7pPr>
+              <a:lvl8pPr marL="3200400" algn="l" defTabSz="914400" rtl="0" eaLnBrk="1" latinLnBrk="1" hangingPunct="1">
+                <a:defRPr sz="1800" kern="1200">
+                  <a:solidFill>
+                    <a:schemeClr val="tx1"/>
+                  </a:solidFill>
+                  <a:latin typeface="+mn-lt"/>
+                  <a:ea typeface="+mn-ea"/>
+                  <a:cs typeface="+mn-cs"/>
+                </a:defRPr>
+              </a:lvl8pPr>
+              <a:lvl9pPr marL="3657600" algn="l" defTabSz="914400" rtl="0" eaLnBrk="1" latinLnBrk="1" hangingPunct="1">
+                <a:defRPr sz="1800" kern="1200">
+                  <a:solidFill>
+                    <a:schemeClr val="tx1"/>
+                  </a:solidFill>
+                  <a:latin typeface="+mn-lt"/>
+                  <a:ea typeface="+mn-ea"/>
+                  <a:cs typeface="+mn-cs"/>
+                </a:defRPr>
+              </a:lvl9pPr>
+            </a:lstStyle>
+            <a:p>
+              <a:pPr marL="177800" indent="-177800" algn="ctr">
+                <a:lnSpc>
+                  <a:spcPct val="80000"/>
+                </a:lnSpc>
+              </a:pPr>
+              <a:r>
+                <a:rPr lang="en-US" altLang="ko-KR" sz="1000" b="1" spc="-20" dirty="0">
+                  <a:latin typeface="나눔고딕" pitchFamily="50" charset="-127"/>
+                  <a:ea typeface="나눔고딕" pitchFamily="50" charset="-127"/>
+                </a:rPr>
+                <a:t>+ </a:t>
+              </a:r>
+              <a:r>
+                <a:rPr lang="en-US" altLang="ko-KR" sz="1000" b="1" dirty="0">
+                  <a:latin typeface="나눔고딕" pitchFamily="50" charset="-127"/>
+                  <a:ea typeface="나눔고딕" pitchFamily="50" charset="-127"/>
+                </a:rPr>
+                <a:t>credit</a:t>
+              </a:r>
+              <a:endParaRPr lang="en-US" altLang="ko-KR" sz="1000" dirty="0">
+                <a:latin typeface="나눔고딕" pitchFamily="50" charset="-127"/>
+                <a:ea typeface="나눔고딕" pitchFamily="50" charset="-127"/>
+              </a:endParaRPr>
+            </a:p>
+          </p:txBody>
+        </p:sp>
+        <p:cxnSp>
+          <p:nvCxnSpPr>
+            <p:cNvPr id="130" name="직선 화살표 연결선 129"/>
+            <p:cNvCxnSpPr/>
+            <p:nvPr/>
+          </p:nvCxnSpPr>
+          <p:spPr>
+            <a:xfrm flipH="1" flipV="1">
+              <a:off x="8170557" y="5567846"/>
+              <a:ext cx="1251378" cy="1"/>
+            </a:xfrm>
+            <a:prstGeom prst="straightConnector1">
+              <a:avLst/>
+            </a:prstGeom>
+            <a:ln w="31750">
+              <a:solidFill>
+                <a:schemeClr val="tx1"/>
+              </a:solidFill>
+              <a:prstDash val="solid"/>
+              <a:tailEnd type="triangle"/>
+            </a:ln>
+          </p:spPr>
+          <p:style>
+            <a:lnRef idx="1">
+              <a:schemeClr val="accent1"/>
+            </a:lnRef>
+            <a:fillRef idx="0">
+              <a:schemeClr val="accent1"/>
+            </a:fillRef>
+            <a:effectRef idx="0">
+              <a:schemeClr val="accent1"/>
+            </a:effectRef>
+            <a:fontRef idx="minor">
+              <a:schemeClr val="tx1"/>
+            </a:fontRef>
+          </p:style>
+        </p:cxnSp>
       </p:grpSp>
     </p:spTree>
     <p:extLst>

</xml_diff>

<commit_message>
sliding layout is on construction
</commit_message>
<xml_diff>
--- a/Carrot AND Stick.pptx
+++ b/Carrot AND Stick.pptx
@@ -260,7 +260,7 @@
           <a:p>
             <a:fld id="{8B9F15C9-92B9-4E75-9419-66BA160F044F}" type="datetimeFigureOut">
               <a:rPr lang="ko-KR" altLang="en-US" smtClean="0"/>
-              <a:t>2016-12-28</a:t>
+              <a:t>2017-01-04</a:t>
             </a:fld>
             <a:endParaRPr lang="ko-KR" altLang="en-US"/>
           </a:p>
@@ -428,7 +428,7 @@
           <a:p>
             <a:fld id="{8B9F15C9-92B9-4E75-9419-66BA160F044F}" type="datetimeFigureOut">
               <a:rPr lang="ko-KR" altLang="en-US" smtClean="0"/>
-              <a:t>2016-12-28</a:t>
+              <a:t>2017-01-04</a:t>
             </a:fld>
             <a:endParaRPr lang="ko-KR" altLang="en-US"/>
           </a:p>
@@ -606,7 +606,7 @@
           <a:p>
             <a:fld id="{8B9F15C9-92B9-4E75-9419-66BA160F044F}" type="datetimeFigureOut">
               <a:rPr lang="ko-KR" altLang="en-US" smtClean="0"/>
-              <a:t>2016-12-28</a:t>
+              <a:t>2017-01-04</a:t>
             </a:fld>
             <a:endParaRPr lang="ko-KR" altLang="en-US"/>
           </a:p>
@@ -774,7 +774,7 @@
           <a:p>
             <a:fld id="{8B9F15C9-92B9-4E75-9419-66BA160F044F}" type="datetimeFigureOut">
               <a:rPr lang="ko-KR" altLang="en-US" smtClean="0"/>
-              <a:t>2016-12-28</a:t>
+              <a:t>2017-01-04</a:t>
             </a:fld>
             <a:endParaRPr lang="ko-KR" altLang="en-US"/>
           </a:p>
@@ -1019,7 +1019,7 @@
           <a:p>
             <a:fld id="{8B9F15C9-92B9-4E75-9419-66BA160F044F}" type="datetimeFigureOut">
               <a:rPr lang="ko-KR" altLang="en-US" smtClean="0"/>
-              <a:t>2016-12-28</a:t>
+              <a:t>2017-01-04</a:t>
             </a:fld>
             <a:endParaRPr lang="ko-KR" altLang="en-US"/>
           </a:p>
@@ -1248,7 +1248,7 @@
           <a:p>
             <a:fld id="{8B9F15C9-92B9-4E75-9419-66BA160F044F}" type="datetimeFigureOut">
               <a:rPr lang="ko-KR" altLang="en-US" smtClean="0"/>
-              <a:t>2016-12-28</a:t>
+              <a:t>2017-01-04</a:t>
             </a:fld>
             <a:endParaRPr lang="ko-KR" altLang="en-US"/>
           </a:p>
@@ -1612,7 +1612,7 @@
           <a:p>
             <a:fld id="{8B9F15C9-92B9-4E75-9419-66BA160F044F}" type="datetimeFigureOut">
               <a:rPr lang="ko-KR" altLang="en-US" smtClean="0"/>
-              <a:t>2016-12-28</a:t>
+              <a:t>2017-01-04</a:t>
             </a:fld>
             <a:endParaRPr lang="ko-KR" altLang="en-US"/>
           </a:p>
@@ -1729,7 +1729,7 @@
           <a:p>
             <a:fld id="{8B9F15C9-92B9-4E75-9419-66BA160F044F}" type="datetimeFigureOut">
               <a:rPr lang="ko-KR" altLang="en-US" smtClean="0"/>
-              <a:t>2016-12-28</a:t>
+              <a:t>2017-01-04</a:t>
             </a:fld>
             <a:endParaRPr lang="ko-KR" altLang="en-US"/>
           </a:p>
@@ -1824,7 +1824,7 @@
           <a:p>
             <a:fld id="{8B9F15C9-92B9-4E75-9419-66BA160F044F}" type="datetimeFigureOut">
               <a:rPr lang="ko-KR" altLang="en-US" smtClean="0"/>
-              <a:t>2016-12-28</a:t>
+              <a:t>2017-01-04</a:t>
             </a:fld>
             <a:endParaRPr lang="ko-KR" altLang="en-US"/>
           </a:p>
@@ -2099,7 +2099,7 @@
           <a:p>
             <a:fld id="{8B9F15C9-92B9-4E75-9419-66BA160F044F}" type="datetimeFigureOut">
               <a:rPr lang="ko-KR" altLang="en-US" smtClean="0"/>
-              <a:t>2016-12-28</a:t>
+              <a:t>2017-01-04</a:t>
             </a:fld>
             <a:endParaRPr lang="ko-KR" altLang="en-US"/>
           </a:p>
@@ -2351,7 +2351,7 @@
           <a:p>
             <a:fld id="{8B9F15C9-92B9-4E75-9419-66BA160F044F}" type="datetimeFigureOut">
               <a:rPr lang="ko-KR" altLang="en-US" smtClean="0"/>
-              <a:t>2016-12-28</a:t>
+              <a:t>2017-01-04</a:t>
             </a:fld>
             <a:endParaRPr lang="ko-KR" altLang="en-US"/>
           </a:p>
@@ -2562,7 +2562,7 @@
           <a:p>
             <a:fld id="{8B9F15C9-92B9-4E75-9419-66BA160F044F}" type="datetimeFigureOut">
               <a:rPr lang="ko-KR" altLang="en-US" smtClean="0"/>
-              <a:t>2016-12-28</a:t>
+              <a:t>2017-01-04</a:t>
             </a:fld>
             <a:endParaRPr lang="ko-KR" altLang="en-US"/>
           </a:p>
@@ -34819,7 +34819,7 @@
                   <a:latin typeface="나눔고딕" pitchFamily="50" charset="-127"/>
                   <a:ea typeface="나눔고딕" pitchFamily="50" charset="-127"/>
                 </a:rPr>
-                <a:t>553</a:t>
+                <a:t>552</a:t>
               </a:r>
               <a:endParaRPr lang="en-US" altLang="ko-KR" sz="1000" dirty="0">
                 <a:latin typeface="나눔고딕" pitchFamily="50" charset="-127"/>
@@ -34954,7 +34954,14 @@
                   <a:latin typeface="나눔고딕" pitchFamily="50" charset="-127"/>
                   <a:ea typeface="나눔고딕" pitchFamily="50" charset="-127"/>
                 </a:rPr>
-                <a:t>alert OFF HOOK</a:t>
+                <a:t>alert </a:t>
+              </a:r>
+              <a:r>
+                <a:rPr lang="en-US" altLang="ko-KR" sz="1000" b="1" spc="-20" dirty="0">
+                  <a:latin typeface="나눔고딕" pitchFamily="50" charset="-127"/>
+                  <a:ea typeface="나눔고딕" pitchFamily="50" charset="-127"/>
+                </a:rPr>
+                <a:t>OUTGOING CALL</a:t>
               </a:r>
               <a:endParaRPr lang="en-US" altLang="ko-KR" sz="1000" spc="-20" dirty="0">
                 <a:latin typeface="나눔고딕" pitchFamily="50" charset="-127"/>
@@ -35950,7 +35957,7 @@
           <a:p>
             <a:pPr marL="177800" indent="-177800" algn="r"/>
             <a:r>
-              <a:rPr lang="en-US" altLang="ko-KR" sz="2800" b="1" spc="-20" dirty="0">
+              <a:rPr lang="en-US" altLang="ko-KR" sz="2800" b="1" spc="-20">
                 <a:solidFill>
                   <a:schemeClr val="tx1">
                     <a:lumMod val="65000"/>
@@ -35960,7 +35967,7 @@
                 <a:latin typeface="나눔고딕" pitchFamily="50" charset="-127"/>
                 <a:ea typeface="나눔고딕" pitchFamily="50" charset="-127"/>
               </a:rPr>
-              <a:t>v.161229</a:t>
+              <a:t>v.170104</a:t>
             </a:r>
             <a:endParaRPr lang="en-US" altLang="ko-KR" sz="2800" spc="-20" dirty="0">
               <a:solidFill>
@@ -38661,7 +38668,7 @@
             <a:p>
               <a:pPr marL="177800" indent="-177800" algn="ctr"/>
               <a:r>
-                <a:rPr lang="en-US" altLang="ko-KR" sz="1100" b="1" dirty="0">
+                <a:rPr lang="en-US" altLang="ko-KR" sz="1100" b="1" spc="-150" dirty="0">
                   <a:solidFill>
                     <a:schemeClr val="tx1">
                       <a:lumMod val="65000"/>
@@ -38671,9 +38678,9 @@
                   <a:latin typeface="나눔고딕" pitchFamily="50" charset="-127"/>
                   <a:ea typeface="나눔고딕" pitchFamily="50" charset="-127"/>
                 </a:rPr>
-                <a:t>CALL RECEIVE</a:t>
+                <a:t>OUTGOING_CALL</a:t>
               </a:r>
-              <a:endParaRPr lang="en-US" altLang="ko-KR" sz="1100" dirty="0">
+              <a:endParaRPr lang="en-US" altLang="ko-KR" sz="1100" spc="-150" dirty="0">
                 <a:solidFill>
                   <a:schemeClr val="tx1">
                     <a:lumMod val="65000"/>
@@ -38962,7 +38969,7 @@
                     <a:latin typeface="나눔고딕" pitchFamily="50" charset="-127"/>
                     <a:ea typeface="나눔고딕" pitchFamily="50" charset="-127"/>
                   </a:rPr>
-                  <a:t>CALL RECEIVE</a:t>
+                  <a:t>Outgoing Call</a:t>
                 </a:r>
                 <a:endParaRPr lang="en-US" altLang="ko-KR" sz="1200" spc="-20" dirty="0">
                   <a:latin typeface="나눔고딕" pitchFamily="50" charset="-127"/>

</xml_diff>

<commit_message>
1. aot_main added percentage relative layout 2. credit ticker finally fix getAction bug 3. framework add more code, forks 4. message system improved - 999 code added 5. layout sliding separated from aot_main 5. setting feature started to work 6. application close feature added
</commit_message>
<xml_diff>
--- a/Carrot AND Stick.pptx
+++ b/Carrot AND Stick.pptx
@@ -260,7 +260,7 @@
           <a:p>
             <a:fld id="{8B9F15C9-92B9-4E75-9419-66BA160F044F}" type="datetimeFigureOut">
               <a:rPr lang="ko-KR" altLang="en-US" smtClean="0"/>
-              <a:t>2017-01-04</a:t>
+              <a:t>2017-01-15</a:t>
             </a:fld>
             <a:endParaRPr lang="ko-KR" altLang="en-US"/>
           </a:p>
@@ -428,7 +428,7 @@
           <a:p>
             <a:fld id="{8B9F15C9-92B9-4E75-9419-66BA160F044F}" type="datetimeFigureOut">
               <a:rPr lang="ko-KR" altLang="en-US" smtClean="0"/>
-              <a:t>2017-01-04</a:t>
+              <a:t>2017-01-15</a:t>
             </a:fld>
             <a:endParaRPr lang="ko-KR" altLang="en-US"/>
           </a:p>
@@ -606,7 +606,7 @@
           <a:p>
             <a:fld id="{8B9F15C9-92B9-4E75-9419-66BA160F044F}" type="datetimeFigureOut">
               <a:rPr lang="ko-KR" altLang="en-US" smtClean="0"/>
-              <a:t>2017-01-04</a:t>
+              <a:t>2017-01-15</a:t>
             </a:fld>
             <a:endParaRPr lang="ko-KR" altLang="en-US"/>
           </a:p>
@@ -774,7 +774,7 @@
           <a:p>
             <a:fld id="{8B9F15C9-92B9-4E75-9419-66BA160F044F}" type="datetimeFigureOut">
               <a:rPr lang="ko-KR" altLang="en-US" smtClean="0"/>
-              <a:t>2017-01-04</a:t>
+              <a:t>2017-01-15</a:t>
             </a:fld>
             <a:endParaRPr lang="ko-KR" altLang="en-US"/>
           </a:p>
@@ -1019,7 +1019,7 @@
           <a:p>
             <a:fld id="{8B9F15C9-92B9-4E75-9419-66BA160F044F}" type="datetimeFigureOut">
               <a:rPr lang="ko-KR" altLang="en-US" smtClean="0"/>
-              <a:t>2017-01-04</a:t>
+              <a:t>2017-01-15</a:t>
             </a:fld>
             <a:endParaRPr lang="ko-KR" altLang="en-US"/>
           </a:p>
@@ -1248,7 +1248,7 @@
           <a:p>
             <a:fld id="{8B9F15C9-92B9-4E75-9419-66BA160F044F}" type="datetimeFigureOut">
               <a:rPr lang="ko-KR" altLang="en-US" smtClean="0"/>
-              <a:t>2017-01-04</a:t>
+              <a:t>2017-01-15</a:t>
             </a:fld>
             <a:endParaRPr lang="ko-KR" altLang="en-US"/>
           </a:p>
@@ -1612,7 +1612,7 @@
           <a:p>
             <a:fld id="{8B9F15C9-92B9-4E75-9419-66BA160F044F}" type="datetimeFigureOut">
               <a:rPr lang="ko-KR" altLang="en-US" smtClean="0"/>
-              <a:t>2017-01-04</a:t>
+              <a:t>2017-01-15</a:t>
             </a:fld>
             <a:endParaRPr lang="ko-KR" altLang="en-US"/>
           </a:p>
@@ -1729,7 +1729,7 @@
           <a:p>
             <a:fld id="{8B9F15C9-92B9-4E75-9419-66BA160F044F}" type="datetimeFigureOut">
               <a:rPr lang="ko-KR" altLang="en-US" smtClean="0"/>
-              <a:t>2017-01-04</a:t>
+              <a:t>2017-01-15</a:t>
             </a:fld>
             <a:endParaRPr lang="ko-KR" altLang="en-US"/>
           </a:p>
@@ -1824,7 +1824,7 @@
           <a:p>
             <a:fld id="{8B9F15C9-92B9-4E75-9419-66BA160F044F}" type="datetimeFigureOut">
               <a:rPr lang="ko-KR" altLang="en-US" smtClean="0"/>
-              <a:t>2017-01-04</a:t>
+              <a:t>2017-01-15</a:t>
             </a:fld>
             <a:endParaRPr lang="ko-KR" altLang="en-US"/>
           </a:p>
@@ -2099,7 +2099,7 @@
           <a:p>
             <a:fld id="{8B9F15C9-92B9-4E75-9419-66BA160F044F}" type="datetimeFigureOut">
               <a:rPr lang="ko-KR" altLang="en-US" smtClean="0"/>
-              <a:t>2017-01-04</a:t>
+              <a:t>2017-01-15</a:t>
             </a:fld>
             <a:endParaRPr lang="ko-KR" altLang="en-US"/>
           </a:p>
@@ -2351,7 +2351,7 @@
           <a:p>
             <a:fld id="{8B9F15C9-92B9-4E75-9419-66BA160F044F}" type="datetimeFigureOut">
               <a:rPr lang="ko-KR" altLang="en-US" smtClean="0"/>
-              <a:t>2017-01-04</a:t>
+              <a:t>2017-01-15</a:t>
             </a:fld>
             <a:endParaRPr lang="ko-KR" altLang="en-US"/>
           </a:p>
@@ -2562,7 +2562,7 @@
           <a:p>
             <a:fld id="{8B9F15C9-92B9-4E75-9419-66BA160F044F}" type="datetimeFigureOut">
               <a:rPr lang="ko-KR" altLang="en-US" smtClean="0"/>
-              <a:t>2017-01-04</a:t>
+              <a:t>2017-01-15</a:t>
             </a:fld>
             <a:endParaRPr lang="ko-KR" altLang="en-US"/>
           </a:p>
@@ -28946,7 +28946,7 @@
         </p:nvGrpSpPr>
         <p:grpSpPr>
           <a:xfrm>
-            <a:off x="299050" y="2492023"/>
+            <a:off x="299819" y="2517253"/>
             <a:ext cx="2461404" cy="4223102"/>
             <a:chOff x="720924" y="2681703"/>
             <a:chExt cx="2461404" cy="3227391"/>
@@ -29999,7 +29999,7 @@
                   <a:latin typeface="나눔고딕" pitchFamily="50" charset="-127"/>
                   <a:ea typeface="나눔고딕" pitchFamily="50" charset="-127"/>
                 </a:rPr>
-                <a:t>connected with AoT</a:t>
+                <a:t>connect with AoT</a:t>
               </a:r>
               <a:endParaRPr lang="en-US" altLang="ko-KR" sz="1000" spc="-20" dirty="0">
                 <a:latin typeface="나눔고딕" pitchFamily="50" charset="-127"/>
@@ -30285,7 +30285,7 @@
                   <a:latin typeface="나눔고딕" pitchFamily="50" charset="-127"/>
                   <a:ea typeface="나눔고딕" pitchFamily="50" charset="-127"/>
                 </a:rPr>
-                <a:t>connected with BG</a:t>
+                <a:t>connect with BG</a:t>
               </a:r>
               <a:endParaRPr lang="en-US" altLang="ko-KR" sz="1000" spc="-20" dirty="0">
                 <a:latin typeface="나눔고딕" pitchFamily="50" charset="-127"/>
@@ -30683,7 +30683,14 @@
                   <a:latin typeface="나눔고딕" pitchFamily="50" charset="-127"/>
                   <a:ea typeface="나눔고딕" pitchFamily="50" charset="-127"/>
                 </a:rPr>
-                <a:t>disconnected with AoT</a:t>
+                <a:t>disconnect </a:t>
+              </a:r>
+              <a:r>
+                <a:rPr lang="en-US" altLang="ko-KR" sz="1000" b="1" spc="-20" dirty="0" err="1">
+                  <a:latin typeface="나눔고딕" pitchFamily="50" charset="-127"/>
+                  <a:ea typeface="나눔고딕" pitchFamily="50" charset="-127"/>
+                </a:rPr>
+                <a:t>AoT</a:t>
               </a:r>
               <a:endParaRPr lang="en-US" altLang="ko-KR" sz="1000" spc="-20" dirty="0">
                 <a:latin typeface="나눔고딕" pitchFamily="50" charset="-127"/>
@@ -31060,7 +31067,7 @@
         </p:nvGrpSpPr>
         <p:grpSpPr>
           <a:xfrm>
-            <a:off x="5770348" y="3897171"/>
+            <a:off x="5770348" y="3721911"/>
             <a:ext cx="651884" cy="1084355"/>
             <a:chOff x="5925020" y="4383822"/>
             <a:chExt cx="794154" cy="694755"/>
@@ -31287,7 +31294,7 @@
         </p:nvSpPr>
         <p:spPr>
           <a:xfrm>
-            <a:off x="2823797" y="4021433"/>
+            <a:off x="2823797" y="3846173"/>
             <a:ext cx="1110028" cy="215444"/>
           </a:xfrm>
           <a:prstGeom prst="rect">
@@ -31422,7 +31429,7 @@
         </p:nvCxnSpPr>
         <p:spPr>
           <a:xfrm flipH="1" flipV="1">
-            <a:off x="2761456" y="4191411"/>
+            <a:off x="2761456" y="4016151"/>
             <a:ext cx="1251378" cy="1"/>
           </a:xfrm>
           <a:prstGeom prst="straightConnector1">
@@ -31459,7 +31466,7 @@
         </p:nvGrpSpPr>
         <p:grpSpPr>
           <a:xfrm>
-            <a:off x="4081802" y="3993631"/>
+            <a:off x="4081802" y="3818371"/>
             <a:ext cx="2014198" cy="246221"/>
             <a:chOff x="4081802" y="3747405"/>
             <a:chExt cx="2014198" cy="246221"/>
@@ -31745,7 +31752,7 @@
         </p:nvSpPr>
         <p:spPr>
           <a:xfrm>
-            <a:off x="2823797" y="4337818"/>
+            <a:off x="2823797" y="4174463"/>
             <a:ext cx="1110028" cy="215444"/>
           </a:xfrm>
           <a:prstGeom prst="rect">
@@ -31880,7 +31887,7 @@
         </p:nvCxnSpPr>
         <p:spPr>
           <a:xfrm flipH="1" flipV="1">
-            <a:off x="2761456" y="4519705"/>
+            <a:off x="2761456" y="4346826"/>
             <a:ext cx="1251378" cy="1"/>
           </a:xfrm>
           <a:prstGeom prst="straightConnector1">
@@ -31917,7 +31924,7 @@
         </p:nvGrpSpPr>
         <p:grpSpPr>
           <a:xfrm>
-            <a:off x="4081802" y="4321921"/>
+            <a:off x="4081802" y="4146661"/>
             <a:ext cx="2014198" cy="246221"/>
             <a:chOff x="4081802" y="3747405"/>
             <a:chExt cx="2014198" cy="246221"/>
@@ -32203,7 +32210,7 @@
         </p:nvSpPr>
         <p:spPr>
           <a:xfrm rot="10800000">
-            <a:off x="5444116" y="4032458"/>
+            <a:off x="5444116" y="3857198"/>
             <a:ext cx="314487" cy="168471"/>
           </a:xfrm>
           <a:prstGeom prst="stripedRightArrow">
@@ -32270,7 +32277,7 @@
         </p:nvSpPr>
         <p:spPr>
           <a:xfrm rot="10800000">
-            <a:off x="5444116" y="4358885"/>
+            <a:off x="5444116" y="4183625"/>
             <a:ext cx="314487" cy="168471"/>
           </a:xfrm>
           <a:prstGeom prst="stripedRightArrow">
@@ -32740,7 +32747,7 @@
                   <a:latin typeface="나눔고딕" pitchFamily="50" charset="-127"/>
                   <a:ea typeface="나눔고딕" pitchFamily="50" charset="-127"/>
                 </a:rPr>
-                <a:t>connected with CT</a:t>
+                <a:t>connect with CT</a:t>
               </a:r>
               <a:endParaRPr lang="en-US" altLang="ko-KR" sz="1000" spc="-20" dirty="0">
                 <a:latin typeface="나눔고딕" pitchFamily="50" charset="-127"/>
@@ -33559,7 +33566,7 @@
                   <a:latin typeface="나눔고딕" pitchFamily="50" charset="-127"/>
                   <a:ea typeface="나눔고딕" pitchFamily="50" charset="-127"/>
                 </a:rPr>
-                <a:t>disconnected with CT</a:t>
+                <a:t>disconnect CT</a:t>
               </a:r>
               <a:endParaRPr lang="en-US" altLang="ko-KR" sz="1000" spc="-20" dirty="0">
                 <a:latin typeface="나눔고딕" pitchFamily="50" charset="-127"/>
@@ -34221,8 +34228,8 @@
         </p:nvSpPr>
         <p:spPr>
           <a:xfrm>
-            <a:off x="2823797" y="5385271"/>
-            <a:ext cx="1110028" cy="215444"/>
+            <a:off x="2793206" y="5143971"/>
+            <a:ext cx="1171210" cy="215444"/>
           </a:xfrm>
           <a:prstGeom prst="rect">
             <a:avLst/>
@@ -34342,11 +34349,18 @@
               <a:t>+ </a:t>
             </a:r>
             <a:r>
+              <a:rPr lang="en-US" altLang="ko-KR" sz="1000" b="1" spc="-150" dirty="0">
+                <a:latin typeface="나눔고딕" pitchFamily="50" charset="-127"/>
+                <a:ea typeface="나눔고딕" pitchFamily="50" charset="-127"/>
+              </a:rPr>
+              <a:t>STATE &amp; </a:t>
+            </a:r>
+            <a:r>
               <a:rPr lang="en-US" altLang="ko-KR" sz="1000" b="1" dirty="0">
                 <a:latin typeface="나눔고딕" pitchFamily="50" charset="-127"/>
                 <a:ea typeface="나눔고딕" pitchFamily="50" charset="-127"/>
               </a:rPr>
-              <a:t>call number</a:t>
+              <a:t>caller ID</a:t>
             </a:r>
             <a:endParaRPr lang="en-US" altLang="ko-KR" sz="1000" dirty="0">
               <a:latin typeface="나눔고딕" pitchFamily="50" charset="-127"/>
@@ -34363,7 +34377,7 @@
         </p:nvCxnSpPr>
         <p:spPr>
           <a:xfrm flipH="1" flipV="1">
-            <a:off x="2761456" y="5555249"/>
+            <a:off x="2761456" y="5313949"/>
             <a:ext cx="1251378" cy="1"/>
           </a:xfrm>
           <a:prstGeom prst="straightConnector1">
@@ -34400,7 +34414,7 @@
         </p:nvGrpSpPr>
         <p:grpSpPr>
           <a:xfrm>
-            <a:off x="4081802" y="5357469"/>
+            <a:off x="4081802" y="5116169"/>
             <a:ext cx="2014198" cy="246221"/>
             <a:chOff x="4081802" y="3747405"/>
             <a:chExt cx="2014198" cy="246221"/>
@@ -34533,7 +34547,7 @@
                   <a:latin typeface="나눔고딕" pitchFamily="50" charset="-127"/>
                   <a:ea typeface="나눔고딕" pitchFamily="50" charset="-127"/>
                 </a:rPr>
-                <a:t>152</a:t>
+                <a:t>151</a:t>
               </a:r>
               <a:endParaRPr lang="en-US" altLang="ko-KR" sz="1000" dirty="0">
                 <a:latin typeface="나눔고딕" pitchFamily="50" charset="-127"/>
@@ -34668,7 +34682,7 @@
                   <a:latin typeface="나눔고딕" pitchFamily="50" charset="-127"/>
                   <a:ea typeface="나눔고딕" pitchFamily="50" charset="-127"/>
                 </a:rPr>
-                <a:t>alert OUTGOING CALL</a:t>
+                <a:t>send PHONESTATE</a:t>
               </a:r>
               <a:endParaRPr lang="en-US" altLang="ko-KR" sz="1000" spc="-20" dirty="0">
                 <a:latin typeface="나눔고딕" pitchFamily="50" charset="-127"/>
@@ -34686,7 +34700,7 @@
         </p:nvGrpSpPr>
         <p:grpSpPr>
           <a:xfrm>
-            <a:off x="6096000" y="5357469"/>
+            <a:off x="6096000" y="5116169"/>
             <a:ext cx="2000024" cy="246221"/>
             <a:chOff x="6096000" y="3747405"/>
             <a:chExt cx="2000024" cy="246221"/>
@@ -34954,14 +34968,7 @@
                   <a:latin typeface="나눔고딕" pitchFamily="50" charset="-127"/>
                   <a:ea typeface="나눔고딕" pitchFamily="50" charset="-127"/>
                 </a:rPr>
-                <a:t>alert </a:t>
-              </a:r>
-              <a:r>
-                <a:rPr lang="en-US" altLang="ko-KR" sz="1000" b="1" spc="-20" dirty="0">
-                  <a:latin typeface="나눔고딕" pitchFamily="50" charset="-127"/>
-                  <a:ea typeface="나눔고딕" pitchFamily="50" charset="-127"/>
-                </a:rPr>
-                <a:t>OUTGOING CALL</a:t>
+                <a:t>alert OUTGOING CALL</a:t>
               </a:r>
               <a:endParaRPr lang="en-US" altLang="ko-KR" sz="1000" spc="-20" dirty="0">
                 <a:latin typeface="나눔고딕" pitchFamily="50" charset="-127"/>
@@ -34979,7 +34986,7 @@
         </p:nvGrpSpPr>
         <p:grpSpPr>
           <a:xfrm flipH="1">
-            <a:off x="8171395" y="5385168"/>
+            <a:off x="8171395" y="5143868"/>
             <a:ext cx="1255351" cy="215444"/>
             <a:chOff x="8170557" y="5397868"/>
             <a:chExt cx="1251378" cy="215444"/>
@@ -35957,7 +35964,7 @@
           <a:p>
             <a:pPr marL="177800" indent="-177800" algn="r"/>
             <a:r>
-              <a:rPr lang="en-US" altLang="ko-KR" sz="2800" b="1" spc="-20">
+              <a:rPr lang="en-US" altLang="ko-KR" sz="2800" b="1" spc="-20" dirty="0">
                 <a:solidFill>
                   <a:schemeClr val="tx1">
                     <a:lumMod val="65000"/>
@@ -35967,7 +35974,7 @@
                 <a:latin typeface="나눔고딕" pitchFamily="50" charset="-127"/>
                 <a:ea typeface="나눔고딕" pitchFamily="50" charset="-127"/>
               </a:rPr>
-              <a:t>v.170104</a:t>
+              <a:t>v.170115</a:t>
             </a:r>
             <a:endParaRPr lang="en-US" altLang="ko-KR" sz="2800" spc="-20" dirty="0">
               <a:solidFill>
@@ -35990,7 +35997,7 @@
         </p:nvGrpSpPr>
         <p:grpSpPr>
           <a:xfrm>
-            <a:off x="6096000" y="3992421"/>
+            <a:off x="6096000" y="3817161"/>
             <a:ext cx="2000024" cy="246221"/>
             <a:chOff x="6096000" y="3747405"/>
             <a:chExt cx="2000024" cy="246221"/>
@@ -36276,7 +36283,7 @@
         </p:nvGrpSpPr>
         <p:grpSpPr>
           <a:xfrm flipH="1">
-            <a:off x="8171395" y="4020120"/>
+            <a:off x="8171395" y="3844860"/>
             <a:ext cx="1255351" cy="215444"/>
             <a:chOff x="8170557" y="5397868"/>
             <a:chExt cx="1251378" cy="215444"/>
@@ -39409,7 +39416,7 @@
         </p:nvSpPr>
         <p:spPr>
           <a:xfrm>
-            <a:off x="2823797" y="4676989"/>
+            <a:off x="2823797" y="4501729"/>
             <a:ext cx="1110028" cy="215444"/>
           </a:xfrm>
           <a:prstGeom prst="rect">
@@ -39544,7 +39551,7 @@
         </p:nvCxnSpPr>
         <p:spPr>
           <a:xfrm flipH="1" flipV="1">
-            <a:off x="2761456" y="4846967"/>
+            <a:off x="2761456" y="4674088"/>
             <a:ext cx="1251378" cy="1"/>
           </a:xfrm>
           <a:prstGeom prst="straightConnector1">
@@ -39581,7 +39588,7 @@
         </p:nvGrpSpPr>
         <p:grpSpPr>
           <a:xfrm>
-            <a:off x="4081802" y="4649187"/>
+            <a:off x="4081802" y="4473927"/>
             <a:ext cx="2014198" cy="246221"/>
             <a:chOff x="4081802" y="3747405"/>
             <a:chExt cx="2014198" cy="246221"/>
@@ -39867,7 +39874,7 @@
         </p:nvSpPr>
         <p:spPr>
           <a:xfrm rot="10800000">
-            <a:off x="5444115" y="4679390"/>
+            <a:off x="5444115" y="4504130"/>
             <a:ext cx="314487" cy="168471"/>
           </a:xfrm>
           <a:prstGeom prst="stripedRightArrow">
@@ -39921,6 +39928,1854 @@
                   <a:lumMod val="40000"/>
                   <a:lumOff val="60000"/>
                 </a:schemeClr>
+              </a:solidFill>
+            </a:endParaRPr>
+          </a:p>
+        </p:txBody>
+      </p:sp>
+      <p:grpSp>
+        <p:nvGrpSpPr>
+          <p:cNvPr id="157" name="그룹 156"/>
+          <p:cNvGrpSpPr/>
+          <p:nvPr/>
+        </p:nvGrpSpPr>
+        <p:grpSpPr>
+          <a:xfrm>
+            <a:off x="357187" y="3812101"/>
+            <a:ext cx="2320653" cy="246221"/>
+            <a:chOff x="1209970" y="3940204"/>
+            <a:chExt cx="2281790" cy="246221"/>
+          </a:xfrm>
+        </p:grpSpPr>
+        <p:sp>
+          <p:nvSpPr>
+            <p:cNvPr id="163" name="TextBox 43"/>
+            <p:cNvSpPr txBox="1"/>
+            <p:nvPr/>
+          </p:nvSpPr>
+          <p:spPr>
+            <a:xfrm>
+              <a:off x="3066337" y="3940204"/>
+              <a:ext cx="425423" cy="246221"/>
+            </a:xfrm>
+            <a:prstGeom prst="rect">
+              <a:avLst/>
+            </a:prstGeom>
+            <a:solidFill>
+              <a:schemeClr val="bg2">
+                <a:lumMod val="10000"/>
+                <a:alpha val="36078"/>
+              </a:schemeClr>
+            </a:solidFill>
+          </p:spPr>
+          <p:txBody>
+            <a:bodyPr wrap="square" rtlCol="0">
+              <a:spAutoFit/>
+            </a:bodyPr>
+            <a:lstStyle>
+              <a:defPPr>
+                <a:defRPr lang="ko-KR"/>
+              </a:defPPr>
+              <a:lvl1pPr marL="0" algn="l" defTabSz="914400" rtl="0" eaLnBrk="1" latinLnBrk="1" hangingPunct="1">
+                <a:defRPr sz="1800" kern="1200">
+                  <a:solidFill>
+                    <a:schemeClr val="tx1"/>
+                  </a:solidFill>
+                  <a:latin typeface="+mn-lt"/>
+                  <a:ea typeface="+mn-ea"/>
+                  <a:cs typeface="+mn-cs"/>
+                </a:defRPr>
+              </a:lvl1pPr>
+              <a:lvl2pPr marL="457200" algn="l" defTabSz="914400" rtl="0" eaLnBrk="1" latinLnBrk="1" hangingPunct="1">
+                <a:defRPr sz="1800" kern="1200">
+                  <a:solidFill>
+                    <a:schemeClr val="tx1"/>
+                  </a:solidFill>
+                  <a:latin typeface="+mn-lt"/>
+                  <a:ea typeface="+mn-ea"/>
+                  <a:cs typeface="+mn-cs"/>
+                </a:defRPr>
+              </a:lvl2pPr>
+              <a:lvl3pPr marL="914400" algn="l" defTabSz="914400" rtl="0" eaLnBrk="1" latinLnBrk="1" hangingPunct="1">
+                <a:defRPr sz="1800" kern="1200">
+                  <a:solidFill>
+                    <a:schemeClr val="tx1"/>
+                  </a:solidFill>
+                  <a:latin typeface="+mn-lt"/>
+                  <a:ea typeface="+mn-ea"/>
+                  <a:cs typeface="+mn-cs"/>
+                </a:defRPr>
+              </a:lvl3pPr>
+              <a:lvl4pPr marL="1371600" algn="l" defTabSz="914400" rtl="0" eaLnBrk="1" latinLnBrk="1" hangingPunct="1">
+                <a:defRPr sz="1800" kern="1200">
+                  <a:solidFill>
+                    <a:schemeClr val="tx1"/>
+                  </a:solidFill>
+                  <a:latin typeface="+mn-lt"/>
+                  <a:ea typeface="+mn-ea"/>
+                  <a:cs typeface="+mn-cs"/>
+                </a:defRPr>
+              </a:lvl4pPr>
+              <a:lvl5pPr marL="1828800" algn="l" defTabSz="914400" rtl="0" eaLnBrk="1" latinLnBrk="1" hangingPunct="1">
+                <a:defRPr sz="1800" kern="1200">
+                  <a:solidFill>
+                    <a:schemeClr val="tx1"/>
+                  </a:solidFill>
+                  <a:latin typeface="+mn-lt"/>
+                  <a:ea typeface="+mn-ea"/>
+                  <a:cs typeface="+mn-cs"/>
+                </a:defRPr>
+              </a:lvl5pPr>
+              <a:lvl6pPr marL="2286000" algn="l" defTabSz="914400" rtl="0" eaLnBrk="1" latinLnBrk="1" hangingPunct="1">
+                <a:defRPr sz="1800" kern="1200">
+                  <a:solidFill>
+                    <a:schemeClr val="tx1"/>
+                  </a:solidFill>
+                  <a:latin typeface="+mn-lt"/>
+                  <a:ea typeface="+mn-ea"/>
+                  <a:cs typeface="+mn-cs"/>
+                </a:defRPr>
+              </a:lvl6pPr>
+              <a:lvl7pPr marL="2743200" algn="l" defTabSz="914400" rtl="0" eaLnBrk="1" latinLnBrk="1" hangingPunct="1">
+                <a:defRPr sz="1800" kern="1200">
+                  <a:solidFill>
+                    <a:schemeClr val="tx1"/>
+                  </a:solidFill>
+                  <a:latin typeface="+mn-lt"/>
+                  <a:ea typeface="+mn-ea"/>
+                  <a:cs typeface="+mn-cs"/>
+                </a:defRPr>
+              </a:lvl7pPr>
+              <a:lvl8pPr marL="3200400" algn="l" defTabSz="914400" rtl="0" eaLnBrk="1" latinLnBrk="1" hangingPunct="1">
+                <a:defRPr sz="1800" kern="1200">
+                  <a:solidFill>
+                    <a:schemeClr val="tx1"/>
+                  </a:solidFill>
+                  <a:latin typeface="+mn-lt"/>
+                  <a:ea typeface="+mn-ea"/>
+                  <a:cs typeface="+mn-cs"/>
+                </a:defRPr>
+              </a:lvl8pPr>
+              <a:lvl9pPr marL="3657600" algn="l" defTabSz="914400" rtl="0" eaLnBrk="1" latinLnBrk="1" hangingPunct="1">
+                <a:defRPr sz="1800" kern="1200">
+                  <a:solidFill>
+                    <a:schemeClr val="tx1"/>
+                  </a:solidFill>
+                  <a:latin typeface="+mn-lt"/>
+                  <a:ea typeface="+mn-ea"/>
+                  <a:cs typeface="+mn-cs"/>
+                </a:defRPr>
+              </a:lvl9pPr>
+            </a:lstStyle>
+            <a:p>
+              <a:pPr marL="177800" indent="-177800" algn="ctr"/>
+              <a:r>
+                <a:rPr lang="en-US" altLang="ko-KR" sz="1000" b="1" dirty="0">
+                  <a:latin typeface="나눔고딕" pitchFamily="50" charset="-127"/>
+                  <a:ea typeface="나눔고딕" pitchFamily="50" charset="-127"/>
+                </a:rPr>
+                <a:t>102</a:t>
+              </a:r>
+              <a:endParaRPr lang="en-US" altLang="ko-KR" sz="1000" dirty="0">
+                <a:latin typeface="나눔고딕" pitchFamily="50" charset="-127"/>
+                <a:ea typeface="나눔고딕" pitchFamily="50" charset="-127"/>
+              </a:endParaRPr>
+            </a:p>
+          </p:txBody>
+        </p:sp>
+        <p:sp>
+          <p:nvSpPr>
+            <p:cNvPr id="164" name="TextBox 52"/>
+            <p:cNvSpPr txBox="1"/>
+            <p:nvPr/>
+          </p:nvSpPr>
+          <p:spPr>
+            <a:xfrm>
+              <a:off x="1209970" y="3970981"/>
+              <a:ext cx="1850318" cy="215444"/>
+            </a:xfrm>
+            <a:prstGeom prst="rect">
+              <a:avLst/>
+            </a:prstGeom>
+            <a:noFill/>
+          </p:spPr>
+          <p:txBody>
+            <a:bodyPr wrap="square" rtlCol="0" anchor="b">
+              <a:spAutoFit/>
+            </a:bodyPr>
+            <a:lstStyle>
+              <a:defPPr>
+                <a:defRPr lang="ko-KR"/>
+              </a:defPPr>
+              <a:lvl1pPr marL="0" algn="l" defTabSz="914400" rtl="0" eaLnBrk="1" latinLnBrk="1" hangingPunct="1">
+                <a:defRPr sz="1800" kern="1200">
+                  <a:solidFill>
+                    <a:schemeClr val="tx1"/>
+                  </a:solidFill>
+                  <a:latin typeface="+mn-lt"/>
+                  <a:ea typeface="+mn-ea"/>
+                  <a:cs typeface="+mn-cs"/>
+                </a:defRPr>
+              </a:lvl1pPr>
+              <a:lvl2pPr marL="457200" algn="l" defTabSz="914400" rtl="0" eaLnBrk="1" latinLnBrk="1" hangingPunct="1">
+                <a:defRPr sz="1800" kern="1200">
+                  <a:solidFill>
+                    <a:schemeClr val="tx1"/>
+                  </a:solidFill>
+                  <a:latin typeface="+mn-lt"/>
+                  <a:ea typeface="+mn-ea"/>
+                  <a:cs typeface="+mn-cs"/>
+                </a:defRPr>
+              </a:lvl2pPr>
+              <a:lvl3pPr marL="914400" algn="l" defTabSz="914400" rtl="0" eaLnBrk="1" latinLnBrk="1" hangingPunct="1">
+                <a:defRPr sz="1800" kern="1200">
+                  <a:solidFill>
+                    <a:schemeClr val="tx1"/>
+                  </a:solidFill>
+                  <a:latin typeface="+mn-lt"/>
+                  <a:ea typeface="+mn-ea"/>
+                  <a:cs typeface="+mn-cs"/>
+                </a:defRPr>
+              </a:lvl3pPr>
+              <a:lvl4pPr marL="1371600" algn="l" defTabSz="914400" rtl="0" eaLnBrk="1" latinLnBrk="1" hangingPunct="1">
+                <a:defRPr sz="1800" kern="1200">
+                  <a:solidFill>
+                    <a:schemeClr val="tx1"/>
+                  </a:solidFill>
+                  <a:latin typeface="+mn-lt"/>
+                  <a:ea typeface="+mn-ea"/>
+                  <a:cs typeface="+mn-cs"/>
+                </a:defRPr>
+              </a:lvl4pPr>
+              <a:lvl5pPr marL="1828800" algn="l" defTabSz="914400" rtl="0" eaLnBrk="1" latinLnBrk="1" hangingPunct="1">
+                <a:defRPr sz="1800" kern="1200">
+                  <a:solidFill>
+                    <a:schemeClr val="tx1"/>
+                  </a:solidFill>
+                  <a:latin typeface="+mn-lt"/>
+                  <a:ea typeface="+mn-ea"/>
+                  <a:cs typeface="+mn-cs"/>
+                </a:defRPr>
+              </a:lvl5pPr>
+              <a:lvl6pPr marL="2286000" algn="l" defTabSz="914400" rtl="0" eaLnBrk="1" latinLnBrk="1" hangingPunct="1">
+                <a:defRPr sz="1800" kern="1200">
+                  <a:solidFill>
+                    <a:schemeClr val="tx1"/>
+                  </a:solidFill>
+                  <a:latin typeface="+mn-lt"/>
+                  <a:ea typeface="+mn-ea"/>
+                  <a:cs typeface="+mn-cs"/>
+                </a:defRPr>
+              </a:lvl6pPr>
+              <a:lvl7pPr marL="2743200" algn="l" defTabSz="914400" rtl="0" eaLnBrk="1" latinLnBrk="1" hangingPunct="1">
+                <a:defRPr sz="1800" kern="1200">
+                  <a:solidFill>
+                    <a:schemeClr val="tx1"/>
+                  </a:solidFill>
+                  <a:latin typeface="+mn-lt"/>
+                  <a:ea typeface="+mn-ea"/>
+                  <a:cs typeface="+mn-cs"/>
+                </a:defRPr>
+              </a:lvl7pPr>
+              <a:lvl8pPr marL="3200400" algn="l" defTabSz="914400" rtl="0" eaLnBrk="1" latinLnBrk="1" hangingPunct="1">
+                <a:defRPr sz="1800" kern="1200">
+                  <a:solidFill>
+                    <a:schemeClr val="tx1"/>
+                  </a:solidFill>
+                  <a:latin typeface="+mn-lt"/>
+                  <a:ea typeface="+mn-ea"/>
+                  <a:cs typeface="+mn-cs"/>
+                </a:defRPr>
+              </a:lvl8pPr>
+              <a:lvl9pPr marL="3657600" algn="l" defTabSz="914400" rtl="0" eaLnBrk="1" latinLnBrk="1" hangingPunct="1">
+                <a:defRPr sz="1800" kern="1200">
+                  <a:solidFill>
+                    <a:schemeClr val="tx1"/>
+                  </a:solidFill>
+                  <a:latin typeface="+mn-lt"/>
+                  <a:ea typeface="+mn-ea"/>
+                  <a:cs typeface="+mn-cs"/>
+                </a:defRPr>
+              </a:lvl9pPr>
+            </a:lstStyle>
+            <a:p>
+              <a:pPr marL="177800" indent="-177800" algn="r">
+                <a:lnSpc>
+                  <a:spcPct val="80000"/>
+                </a:lnSpc>
+              </a:pPr>
+              <a:r>
+                <a:rPr lang="en-US" altLang="ko-KR" sz="1000" b="1" spc="-20" dirty="0">
+                  <a:latin typeface="나눔고딕" pitchFamily="50" charset="-127"/>
+                  <a:ea typeface="나눔고딕" pitchFamily="50" charset="-127"/>
+                </a:rPr>
+                <a:t>request CREDIT info</a:t>
+              </a:r>
+              <a:endParaRPr lang="en-US" altLang="ko-KR" sz="1000" spc="-20" dirty="0">
+                <a:latin typeface="나눔고딕" pitchFamily="50" charset="-127"/>
+                <a:ea typeface="나눔고딕" pitchFamily="50" charset="-127"/>
+              </a:endParaRPr>
+            </a:p>
+          </p:txBody>
+        </p:sp>
+      </p:grpSp>
+      <p:cxnSp>
+        <p:nvCxnSpPr>
+          <p:cNvPr id="165" name="직선 화살표 연결선 164"/>
+          <p:cNvCxnSpPr/>
+          <p:nvPr/>
+        </p:nvCxnSpPr>
+        <p:spPr>
+          <a:xfrm>
+            <a:off x="2760454" y="3848215"/>
+            <a:ext cx="1243749" cy="0"/>
+          </a:xfrm>
+          <a:prstGeom prst="straightConnector1">
+            <a:avLst/>
+          </a:prstGeom>
+          <a:ln w="31750">
+            <a:solidFill>
+              <a:schemeClr val="tx1"/>
+            </a:solidFill>
+            <a:tailEnd type="triangle"/>
+          </a:ln>
+        </p:spPr>
+        <p:style>
+          <a:lnRef idx="1">
+            <a:schemeClr val="accent1"/>
+          </a:lnRef>
+          <a:fillRef idx="0">
+            <a:schemeClr val="accent1"/>
+          </a:fillRef>
+          <a:effectRef idx="0">
+            <a:schemeClr val="accent1"/>
+          </a:effectRef>
+          <a:fontRef idx="minor">
+            <a:schemeClr val="tx1"/>
+          </a:fontRef>
+        </p:style>
+      </p:cxnSp>
+      <p:grpSp>
+        <p:nvGrpSpPr>
+          <p:cNvPr id="171" name="그룹 170"/>
+          <p:cNvGrpSpPr/>
+          <p:nvPr/>
+        </p:nvGrpSpPr>
+        <p:grpSpPr>
+          <a:xfrm>
+            <a:off x="357187" y="4143583"/>
+            <a:ext cx="2320653" cy="246221"/>
+            <a:chOff x="1209970" y="3940204"/>
+            <a:chExt cx="2281790" cy="246221"/>
+          </a:xfrm>
+        </p:grpSpPr>
+        <p:sp>
+          <p:nvSpPr>
+            <p:cNvPr id="172" name="TextBox 43"/>
+            <p:cNvSpPr txBox="1"/>
+            <p:nvPr/>
+          </p:nvSpPr>
+          <p:spPr>
+            <a:xfrm>
+              <a:off x="3066337" y="3940204"/>
+              <a:ext cx="425423" cy="246221"/>
+            </a:xfrm>
+            <a:prstGeom prst="rect">
+              <a:avLst/>
+            </a:prstGeom>
+            <a:solidFill>
+              <a:schemeClr val="bg2">
+                <a:lumMod val="10000"/>
+                <a:alpha val="36078"/>
+              </a:schemeClr>
+            </a:solidFill>
+          </p:spPr>
+          <p:txBody>
+            <a:bodyPr wrap="square" rtlCol="0">
+              <a:spAutoFit/>
+            </a:bodyPr>
+            <a:lstStyle>
+              <a:defPPr>
+                <a:defRPr lang="ko-KR"/>
+              </a:defPPr>
+              <a:lvl1pPr marL="0" algn="l" defTabSz="914400" rtl="0" eaLnBrk="1" latinLnBrk="1" hangingPunct="1">
+                <a:defRPr sz="1800" kern="1200">
+                  <a:solidFill>
+                    <a:schemeClr val="tx1"/>
+                  </a:solidFill>
+                  <a:latin typeface="+mn-lt"/>
+                  <a:ea typeface="+mn-ea"/>
+                  <a:cs typeface="+mn-cs"/>
+                </a:defRPr>
+              </a:lvl1pPr>
+              <a:lvl2pPr marL="457200" algn="l" defTabSz="914400" rtl="0" eaLnBrk="1" latinLnBrk="1" hangingPunct="1">
+                <a:defRPr sz="1800" kern="1200">
+                  <a:solidFill>
+                    <a:schemeClr val="tx1"/>
+                  </a:solidFill>
+                  <a:latin typeface="+mn-lt"/>
+                  <a:ea typeface="+mn-ea"/>
+                  <a:cs typeface="+mn-cs"/>
+                </a:defRPr>
+              </a:lvl2pPr>
+              <a:lvl3pPr marL="914400" algn="l" defTabSz="914400" rtl="0" eaLnBrk="1" latinLnBrk="1" hangingPunct="1">
+                <a:defRPr sz="1800" kern="1200">
+                  <a:solidFill>
+                    <a:schemeClr val="tx1"/>
+                  </a:solidFill>
+                  <a:latin typeface="+mn-lt"/>
+                  <a:ea typeface="+mn-ea"/>
+                  <a:cs typeface="+mn-cs"/>
+                </a:defRPr>
+              </a:lvl3pPr>
+              <a:lvl4pPr marL="1371600" algn="l" defTabSz="914400" rtl="0" eaLnBrk="1" latinLnBrk="1" hangingPunct="1">
+                <a:defRPr sz="1800" kern="1200">
+                  <a:solidFill>
+                    <a:schemeClr val="tx1"/>
+                  </a:solidFill>
+                  <a:latin typeface="+mn-lt"/>
+                  <a:ea typeface="+mn-ea"/>
+                  <a:cs typeface="+mn-cs"/>
+                </a:defRPr>
+              </a:lvl4pPr>
+              <a:lvl5pPr marL="1828800" algn="l" defTabSz="914400" rtl="0" eaLnBrk="1" latinLnBrk="1" hangingPunct="1">
+                <a:defRPr sz="1800" kern="1200">
+                  <a:solidFill>
+                    <a:schemeClr val="tx1"/>
+                  </a:solidFill>
+                  <a:latin typeface="+mn-lt"/>
+                  <a:ea typeface="+mn-ea"/>
+                  <a:cs typeface="+mn-cs"/>
+                </a:defRPr>
+              </a:lvl5pPr>
+              <a:lvl6pPr marL="2286000" algn="l" defTabSz="914400" rtl="0" eaLnBrk="1" latinLnBrk="1" hangingPunct="1">
+                <a:defRPr sz="1800" kern="1200">
+                  <a:solidFill>
+                    <a:schemeClr val="tx1"/>
+                  </a:solidFill>
+                  <a:latin typeface="+mn-lt"/>
+                  <a:ea typeface="+mn-ea"/>
+                  <a:cs typeface="+mn-cs"/>
+                </a:defRPr>
+              </a:lvl6pPr>
+              <a:lvl7pPr marL="2743200" algn="l" defTabSz="914400" rtl="0" eaLnBrk="1" latinLnBrk="1" hangingPunct="1">
+                <a:defRPr sz="1800" kern="1200">
+                  <a:solidFill>
+                    <a:schemeClr val="tx1"/>
+                  </a:solidFill>
+                  <a:latin typeface="+mn-lt"/>
+                  <a:ea typeface="+mn-ea"/>
+                  <a:cs typeface="+mn-cs"/>
+                </a:defRPr>
+              </a:lvl7pPr>
+              <a:lvl8pPr marL="3200400" algn="l" defTabSz="914400" rtl="0" eaLnBrk="1" latinLnBrk="1" hangingPunct="1">
+                <a:defRPr sz="1800" kern="1200">
+                  <a:solidFill>
+                    <a:schemeClr val="tx1"/>
+                  </a:solidFill>
+                  <a:latin typeface="+mn-lt"/>
+                  <a:ea typeface="+mn-ea"/>
+                  <a:cs typeface="+mn-cs"/>
+                </a:defRPr>
+              </a:lvl8pPr>
+              <a:lvl9pPr marL="3657600" algn="l" defTabSz="914400" rtl="0" eaLnBrk="1" latinLnBrk="1" hangingPunct="1">
+                <a:defRPr sz="1800" kern="1200">
+                  <a:solidFill>
+                    <a:schemeClr val="tx1"/>
+                  </a:solidFill>
+                  <a:latin typeface="+mn-lt"/>
+                  <a:ea typeface="+mn-ea"/>
+                  <a:cs typeface="+mn-cs"/>
+                </a:defRPr>
+              </a:lvl9pPr>
+            </a:lstStyle>
+            <a:p>
+              <a:pPr marL="177800" indent="-177800" algn="ctr"/>
+              <a:r>
+                <a:rPr lang="en-US" altLang="ko-KR" sz="1000" b="1" dirty="0">
+                  <a:latin typeface="나눔고딕" pitchFamily="50" charset="-127"/>
+                  <a:ea typeface="나눔고딕" pitchFamily="50" charset="-127"/>
+                </a:rPr>
+                <a:t>103</a:t>
+              </a:r>
+              <a:endParaRPr lang="en-US" altLang="ko-KR" sz="1000" dirty="0">
+                <a:latin typeface="나눔고딕" pitchFamily="50" charset="-127"/>
+                <a:ea typeface="나눔고딕" pitchFamily="50" charset="-127"/>
+              </a:endParaRPr>
+            </a:p>
+          </p:txBody>
+        </p:sp>
+        <p:sp>
+          <p:nvSpPr>
+            <p:cNvPr id="173" name="TextBox 52"/>
+            <p:cNvSpPr txBox="1"/>
+            <p:nvPr/>
+          </p:nvSpPr>
+          <p:spPr>
+            <a:xfrm>
+              <a:off x="1209970" y="3970981"/>
+              <a:ext cx="1850318" cy="215444"/>
+            </a:xfrm>
+            <a:prstGeom prst="rect">
+              <a:avLst/>
+            </a:prstGeom>
+            <a:noFill/>
+          </p:spPr>
+          <p:txBody>
+            <a:bodyPr wrap="square" rtlCol="0" anchor="b">
+              <a:spAutoFit/>
+            </a:bodyPr>
+            <a:lstStyle>
+              <a:defPPr>
+                <a:defRPr lang="ko-KR"/>
+              </a:defPPr>
+              <a:lvl1pPr marL="0" algn="l" defTabSz="914400" rtl="0" eaLnBrk="1" latinLnBrk="1" hangingPunct="1">
+                <a:defRPr sz="1800" kern="1200">
+                  <a:solidFill>
+                    <a:schemeClr val="tx1"/>
+                  </a:solidFill>
+                  <a:latin typeface="+mn-lt"/>
+                  <a:ea typeface="+mn-ea"/>
+                  <a:cs typeface="+mn-cs"/>
+                </a:defRPr>
+              </a:lvl1pPr>
+              <a:lvl2pPr marL="457200" algn="l" defTabSz="914400" rtl="0" eaLnBrk="1" latinLnBrk="1" hangingPunct="1">
+                <a:defRPr sz="1800" kern="1200">
+                  <a:solidFill>
+                    <a:schemeClr val="tx1"/>
+                  </a:solidFill>
+                  <a:latin typeface="+mn-lt"/>
+                  <a:ea typeface="+mn-ea"/>
+                  <a:cs typeface="+mn-cs"/>
+                </a:defRPr>
+              </a:lvl2pPr>
+              <a:lvl3pPr marL="914400" algn="l" defTabSz="914400" rtl="0" eaLnBrk="1" latinLnBrk="1" hangingPunct="1">
+                <a:defRPr sz="1800" kern="1200">
+                  <a:solidFill>
+                    <a:schemeClr val="tx1"/>
+                  </a:solidFill>
+                  <a:latin typeface="+mn-lt"/>
+                  <a:ea typeface="+mn-ea"/>
+                  <a:cs typeface="+mn-cs"/>
+                </a:defRPr>
+              </a:lvl3pPr>
+              <a:lvl4pPr marL="1371600" algn="l" defTabSz="914400" rtl="0" eaLnBrk="1" latinLnBrk="1" hangingPunct="1">
+                <a:defRPr sz="1800" kern="1200">
+                  <a:solidFill>
+                    <a:schemeClr val="tx1"/>
+                  </a:solidFill>
+                  <a:latin typeface="+mn-lt"/>
+                  <a:ea typeface="+mn-ea"/>
+                  <a:cs typeface="+mn-cs"/>
+                </a:defRPr>
+              </a:lvl4pPr>
+              <a:lvl5pPr marL="1828800" algn="l" defTabSz="914400" rtl="0" eaLnBrk="1" latinLnBrk="1" hangingPunct="1">
+                <a:defRPr sz="1800" kern="1200">
+                  <a:solidFill>
+                    <a:schemeClr val="tx1"/>
+                  </a:solidFill>
+                  <a:latin typeface="+mn-lt"/>
+                  <a:ea typeface="+mn-ea"/>
+                  <a:cs typeface="+mn-cs"/>
+                </a:defRPr>
+              </a:lvl5pPr>
+              <a:lvl6pPr marL="2286000" algn="l" defTabSz="914400" rtl="0" eaLnBrk="1" latinLnBrk="1" hangingPunct="1">
+                <a:defRPr sz="1800" kern="1200">
+                  <a:solidFill>
+                    <a:schemeClr val="tx1"/>
+                  </a:solidFill>
+                  <a:latin typeface="+mn-lt"/>
+                  <a:ea typeface="+mn-ea"/>
+                  <a:cs typeface="+mn-cs"/>
+                </a:defRPr>
+              </a:lvl6pPr>
+              <a:lvl7pPr marL="2743200" algn="l" defTabSz="914400" rtl="0" eaLnBrk="1" latinLnBrk="1" hangingPunct="1">
+                <a:defRPr sz="1800" kern="1200">
+                  <a:solidFill>
+                    <a:schemeClr val="tx1"/>
+                  </a:solidFill>
+                  <a:latin typeface="+mn-lt"/>
+                  <a:ea typeface="+mn-ea"/>
+                  <a:cs typeface="+mn-cs"/>
+                </a:defRPr>
+              </a:lvl7pPr>
+              <a:lvl8pPr marL="3200400" algn="l" defTabSz="914400" rtl="0" eaLnBrk="1" latinLnBrk="1" hangingPunct="1">
+                <a:defRPr sz="1800" kern="1200">
+                  <a:solidFill>
+                    <a:schemeClr val="tx1"/>
+                  </a:solidFill>
+                  <a:latin typeface="+mn-lt"/>
+                  <a:ea typeface="+mn-ea"/>
+                  <a:cs typeface="+mn-cs"/>
+                </a:defRPr>
+              </a:lvl8pPr>
+              <a:lvl9pPr marL="3657600" algn="l" defTabSz="914400" rtl="0" eaLnBrk="1" latinLnBrk="1" hangingPunct="1">
+                <a:defRPr sz="1800" kern="1200">
+                  <a:solidFill>
+                    <a:schemeClr val="tx1"/>
+                  </a:solidFill>
+                  <a:latin typeface="+mn-lt"/>
+                  <a:ea typeface="+mn-ea"/>
+                  <a:cs typeface="+mn-cs"/>
+                </a:defRPr>
+              </a:lvl9pPr>
+            </a:lstStyle>
+            <a:p>
+              <a:pPr marL="177800" indent="-177800" algn="r">
+                <a:lnSpc>
+                  <a:spcPct val="80000"/>
+                </a:lnSpc>
+              </a:pPr>
+              <a:r>
+                <a:rPr lang="en-US" altLang="ko-KR" sz="1000" b="1" spc="-20" dirty="0">
+                  <a:latin typeface="나눔고딕" pitchFamily="50" charset="-127"/>
+                  <a:ea typeface="나눔고딕" pitchFamily="50" charset="-127"/>
+                </a:rPr>
+                <a:t>request SETTING info</a:t>
+              </a:r>
+              <a:endParaRPr lang="en-US" altLang="ko-KR" sz="1000" spc="-20" dirty="0">
+                <a:latin typeface="나눔고딕" pitchFamily="50" charset="-127"/>
+                <a:ea typeface="나눔고딕" pitchFamily="50" charset="-127"/>
+              </a:endParaRPr>
+            </a:p>
+          </p:txBody>
+        </p:sp>
+      </p:grpSp>
+      <p:cxnSp>
+        <p:nvCxnSpPr>
+          <p:cNvPr id="174" name="직선 화살표 연결선 173"/>
+          <p:cNvCxnSpPr/>
+          <p:nvPr/>
+        </p:nvCxnSpPr>
+        <p:spPr>
+          <a:xfrm>
+            <a:off x="2760454" y="4178385"/>
+            <a:ext cx="1243749" cy="0"/>
+          </a:xfrm>
+          <a:prstGeom prst="straightConnector1">
+            <a:avLst/>
+          </a:prstGeom>
+          <a:ln w="31750">
+            <a:solidFill>
+              <a:schemeClr val="tx1"/>
+            </a:solidFill>
+            <a:tailEnd type="triangle"/>
+          </a:ln>
+        </p:spPr>
+        <p:style>
+          <a:lnRef idx="1">
+            <a:schemeClr val="accent1"/>
+          </a:lnRef>
+          <a:fillRef idx="0">
+            <a:schemeClr val="accent1"/>
+          </a:fillRef>
+          <a:effectRef idx="0">
+            <a:schemeClr val="accent1"/>
+          </a:effectRef>
+          <a:fontRef idx="minor">
+            <a:schemeClr val="tx1"/>
+          </a:fontRef>
+        </p:style>
+      </p:cxnSp>
+      <p:grpSp>
+        <p:nvGrpSpPr>
+          <p:cNvPr id="175" name="그룹 174"/>
+          <p:cNvGrpSpPr/>
+          <p:nvPr/>
+        </p:nvGrpSpPr>
+        <p:grpSpPr>
+          <a:xfrm>
+            <a:off x="357187" y="4479251"/>
+            <a:ext cx="2320653" cy="246221"/>
+            <a:chOff x="1209970" y="3940204"/>
+            <a:chExt cx="2281790" cy="246221"/>
+          </a:xfrm>
+        </p:grpSpPr>
+        <p:sp>
+          <p:nvSpPr>
+            <p:cNvPr id="176" name="TextBox 43"/>
+            <p:cNvSpPr txBox="1"/>
+            <p:nvPr/>
+          </p:nvSpPr>
+          <p:spPr>
+            <a:xfrm>
+              <a:off x="3066337" y="3940204"/>
+              <a:ext cx="425423" cy="246221"/>
+            </a:xfrm>
+            <a:prstGeom prst="rect">
+              <a:avLst/>
+            </a:prstGeom>
+            <a:solidFill>
+              <a:schemeClr val="bg2">
+                <a:lumMod val="10000"/>
+                <a:alpha val="36078"/>
+              </a:schemeClr>
+            </a:solidFill>
+          </p:spPr>
+          <p:txBody>
+            <a:bodyPr wrap="square" rtlCol="0">
+              <a:spAutoFit/>
+            </a:bodyPr>
+            <a:lstStyle>
+              <a:defPPr>
+                <a:defRPr lang="ko-KR"/>
+              </a:defPPr>
+              <a:lvl1pPr marL="0" algn="l" defTabSz="914400" rtl="0" eaLnBrk="1" latinLnBrk="1" hangingPunct="1">
+                <a:defRPr sz="1800" kern="1200">
+                  <a:solidFill>
+                    <a:schemeClr val="tx1"/>
+                  </a:solidFill>
+                  <a:latin typeface="+mn-lt"/>
+                  <a:ea typeface="+mn-ea"/>
+                  <a:cs typeface="+mn-cs"/>
+                </a:defRPr>
+              </a:lvl1pPr>
+              <a:lvl2pPr marL="457200" algn="l" defTabSz="914400" rtl="0" eaLnBrk="1" latinLnBrk="1" hangingPunct="1">
+                <a:defRPr sz="1800" kern="1200">
+                  <a:solidFill>
+                    <a:schemeClr val="tx1"/>
+                  </a:solidFill>
+                  <a:latin typeface="+mn-lt"/>
+                  <a:ea typeface="+mn-ea"/>
+                  <a:cs typeface="+mn-cs"/>
+                </a:defRPr>
+              </a:lvl2pPr>
+              <a:lvl3pPr marL="914400" algn="l" defTabSz="914400" rtl="0" eaLnBrk="1" latinLnBrk="1" hangingPunct="1">
+                <a:defRPr sz="1800" kern="1200">
+                  <a:solidFill>
+                    <a:schemeClr val="tx1"/>
+                  </a:solidFill>
+                  <a:latin typeface="+mn-lt"/>
+                  <a:ea typeface="+mn-ea"/>
+                  <a:cs typeface="+mn-cs"/>
+                </a:defRPr>
+              </a:lvl3pPr>
+              <a:lvl4pPr marL="1371600" algn="l" defTabSz="914400" rtl="0" eaLnBrk="1" latinLnBrk="1" hangingPunct="1">
+                <a:defRPr sz="1800" kern="1200">
+                  <a:solidFill>
+                    <a:schemeClr val="tx1"/>
+                  </a:solidFill>
+                  <a:latin typeface="+mn-lt"/>
+                  <a:ea typeface="+mn-ea"/>
+                  <a:cs typeface="+mn-cs"/>
+                </a:defRPr>
+              </a:lvl4pPr>
+              <a:lvl5pPr marL="1828800" algn="l" defTabSz="914400" rtl="0" eaLnBrk="1" latinLnBrk="1" hangingPunct="1">
+                <a:defRPr sz="1800" kern="1200">
+                  <a:solidFill>
+                    <a:schemeClr val="tx1"/>
+                  </a:solidFill>
+                  <a:latin typeface="+mn-lt"/>
+                  <a:ea typeface="+mn-ea"/>
+                  <a:cs typeface="+mn-cs"/>
+                </a:defRPr>
+              </a:lvl5pPr>
+              <a:lvl6pPr marL="2286000" algn="l" defTabSz="914400" rtl="0" eaLnBrk="1" latinLnBrk="1" hangingPunct="1">
+                <a:defRPr sz="1800" kern="1200">
+                  <a:solidFill>
+                    <a:schemeClr val="tx1"/>
+                  </a:solidFill>
+                  <a:latin typeface="+mn-lt"/>
+                  <a:ea typeface="+mn-ea"/>
+                  <a:cs typeface="+mn-cs"/>
+                </a:defRPr>
+              </a:lvl6pPr>
+              <a:lvl7pPr marL="2743200" algn="l" defTabSz="914400" rtl="0" eaLnBrk="1" latinLnBrk="1" hangingPunct="1">
+                <a:defRPr sz="1800" kern="1200">
+                  <a:solidFill>
+                    <a:schemeClr val="tx1"/>
+                  </a:solidFill>
+                  <a:latin typeface="+mn-lt"/>
+                  <a:ea typeface="+mn-ea"/>
+                  <a:cs typeface="+mn-cs"/>
+                </a:defRPr>
+              </a:lvl7pPr>
+              <a:lvl8pPr marL="3200400" algn="l" defTabSz="914400" rtl="0" eaLnBrk="1" latinLnBrk="1" hangingPunct="1">
+                <a:defRPr sz="1800" kern="1200">
+                  <a:solidFill>
+                    <a:schemeClr val="tx1"/>
+                  </a:solidFill>
+                  <a:latin typeface="+mn-lt"/>
+                  <a:ea typeface="+mn-ea"/>
+                  <a:cs typeface="+mn-cs"/>
+                </a:defRPr>
+              </a:lvl8pPr>
+              <a:lvl9pPr marL="3657600" algn="l" defTabSz="914400" rtl="0" eaLnBrk="1" latinLnBrk="1" hangingPunct="1">
+                <a:defRPr sz="1800" kern="1200">
+                  <a:solidFill>
+                    <a:schemeClr val="tx1"/>
+                  </a:solidFill>
+                  <a:latin typeface="+mn-lt"/>
+                  <a:ea typeface="+mn-ea"/>
+                  <a:cs typeface="+mn-cs"/>
+                </a:defRPr>
+              </a:lvl9pPr>
+            </a:lstStyle>
+            <a:p>
+              <a:pPr marL="177800" indent="-177800" algn="ctr"/>
+              <a:r>
+                <a:rPr lang="en-US" altLang="ko-KR" sz="1000" b="1" dirty="0">
+                  <a:latin typeface="나눔고딕" pitchFamily="50" charset="-127"/>
+                  <a:ea typeface="나눔고딕" pitchFamily="50" charset="-127"/>
+                </a:rPr>
+                <a:t>104</a:t>
+              </a:r>
+              <a:endParaRPr lang="en-US" altLang="ko-KR" sz="1000" dirty="0">
+                <a:latin typeface="나눔고딕" pitchFamily="50" charset="-127"/>
+                <a:ea typeface="나눔고딕" pitchFamily="50" charset="-127"/>
+              </a:endParaRPr>
+            </a:p>
+          </p:txBody>
+        </p:sp>
+        <p:sp>
+          <p:nvSpPr>
+            <p:cNvPr id="177" name="TextBox 52"/>
+            <p:cNvSpPr txBox="1"/>
+            <p:nvPr/>
+          </p:nvSpPr>
+          <p:spPr>
+            <a:xfrm>
+              <a:off x="1209970" y="3970981"/>
+              <a:ext cx="1850318" cy="215444"/>
+            </a:xfrm>
+            <a:prstGeom prst="rect">
+              <a:avLst/>
+            </a:prstGeom>
+            <a:noFill/>
+          </p:spPr>
+          <p:txBody>
+            <a:bodyPr wrap="square" rtlCol="0" anchor="b">
+              <a:spAutoFit/>
+            </a:bodyPr>
+            <a:lstStyle>
+              <a:defPPr>
+                <a:defRPr lang="ko-KR"/>
+              </a:defPPr>
+              <a:lvl1pPr marL="0" algn="l" defTabSz="914400" rtl="0" eaLnBrk="1" latinLnBrk="1" hangingPunct="1">
+                <a:defRPr sz="1800" kern="1200">
+                  <a:solidFill>
+                    <a:schemeClr val="tx1"/>
+                  </a:solidFill>
+                  <a:latin typeface="+mn-lt"/>
+                  <a:ea typeface="+mn-ea"/>
+                  <a:cs typeface="+mn-cs"/>
+                </a:defRPr>
+              </a:lvl1pPr>
+              <a:lvl2pPr marL="457200" algn="l" defTabSz="914400" rtl="0" eaLnBrk="1" latinLnBrk="1" hangingPunct="1">
+                <a:defRPr sz="1800" kern="1200">
+                  <a:solidFill>
+                    <a:schemeClr val="tx1"/>
+                  </a:solidFill>
+                  <a:latin typeface="+mn-lt"/>
+                  <a:ea typeface="+mn-ea"/>
+                  <a:cs typeface="+mn-cs"/>
+                </a:defRPr>
+              </a:lvl2pPr>
+              <a:lvl3pPr marL="914400" algn="l" defTabSz="914400" rtl="0" eaLnBrk="1" latinLnBrk="1" hangingPunct="1">
+                <a:defRPr sz="1800" kern="1200">
+                  <a:solidFill>
+                    <a:schemeClr val="tx1"/>
+                  </a:solidFill>
+                  <a:latin typeface="+mn-lt"/>
+                  <a:ea typeface="+mn-ea"/>
+                  <a:cs typeface="+mn-cs"/>
+                </a:defRPr>
+              </a:lvl3pPr>
+              <a:lvl4pPr marL="1371600" algn="l" defTabSz="914400" rtl="0" eaLnBrk="1" latinLnBrk="1" hangingPunct="1">
+                <a:defRPr sz="1800" kern="1200">
+                  <a:solidFill>
+                    <a:schemeClr val="tx1"/>
+                  </a:solidFill>
+                  <a:latin typeface="+mn-lt"/>
+                  <a:ea typeface="+mn-ea"/>
+                  <a:cs typeface="+mn-cs"/>
+                </a:defRPr>
+              </a:lvl4pPr>
+              <a:lvl5pPr marL="1828800" algn="l" defTabSz="914400" rtl="0" eaLnBrk="1" latinLnBrk="1" hangingPunct="1">
+                <a:defRPr sz="1800" kern="1200">
+                  <a:solidFill>
+                    <a:schemeClr val="tx1"/>
+                  </a:solidFill>
+                  <a:latin typeface="+mn-lt"/>
+                  <a:ea typeface="+mn-ea"/>
+                  <a:cs typeface="+mn-cs"/>
+                </a:defRPr>
+              </a:lvl5pPr>
+              <a:lvl6pPr marL="2286000" algn="l" defTabSz="914400" rtl="0" eaLnBrk="1" latinLnBrk="1" hangingPunct="1">
+                <a:defRPr sz="1800" kern="1200">
+                  <a:solidFill>
+                    <a:schemeClr val="tx1"/>
+                  </a:solidFill>
+                  <a:latin typeface="+mn-lt"/>
+                  <a:ea typeface="+mn-ea"/>
+                  <a:cs typeface="+mn-cs"/>
+                </a:defRPr>
+              </a:lvl6pPr>
+              <a:lvl7pPr marL="2743200" algn="l" defTabSz="914400" rtl="0" eaLnBrk="1" latinLnBrk="1" hangingPunct="1">
+                <a:defRPr sz="1800" kern="1200">
+                  <a:solidFill>
+                    <a:schemeClr val="tx1"/>
+                  </a:solidFill>
+                  <a:latin typeface="+mn-lt"/>
+                  <a:ea typeface="+mn-ea"/>
+                  <a:cs typeface="+mn-cs"/>
+                </a:defRPr>
+              </a:lvl7pPr>
+              <a:lvl8pPr marL="3200400" algn="l" defTabSz="914400" rtl="0" eaLnBrk="1" latinLnBrk="1" hangingPunct="1">
+                <a:defRPr sz="1800" kern="1200">
+                  <a:solidFill>
+                    <a:schemeClr val="tx1"/>
+                  </a:solidFill>
+                  <a:latin typeface="+mn-lt"/>
+                  <a:ea typeface="+mn-ea"/>
+                  <a:cs typeface="+mn-cs"/>
+                </a:defRPr>
+              </a:lvl8pPr>
+              <a:lvl9pPr marL="3657600" algn="l" defTabSz="914400" rtl="0" eaLnBrk="1" latinLnBrk="1" hangingPunct="1">
+                <a:defRPr sz="1800" kern="1200">
+                  <a:solidFill>
+                    <a:schemeClr val="tx1"/>
+                  </a:solidFill>
+                  <a:latin typeface="+mn-lt"/>
+                  <a:ea typeface="+mn-ea"/>
+                  <a:cs typeface="+mn-cs"/>
+                </a:defRPr>
+              </a:lvl9pPr>
+            </a:lstStyle>
+            <a:p>
+              <a:pPr marL="177800" indent="-177800" algn="r">
+                <a:lnSpc>
+                  <a:spcPct val="80000"/>
+                </a:lnSpc>
+              </a:pPr>
+              <a:r>
+                <a:rPr lang="en-US" altLang="ko-KR" sz="1000" b="1" spc="-20" dirty="0">
+                  <a:latin typeface="나눔고딕" pitchFamily="50" charset="-127"/>
+                  <a:ea typeface="나눔고딕" pitchFamily="50" charset="-127"/>
+                </a:rPr>
+                <a:t>request LOG info</a:t>
+              </a:r>
+              <a:endParaRPr lang="en-US" altLang="ko-KR" sz="1000" spc="-20" dirty="0">
+                <a:latin typeface="나눔고딕" pitchFamily="50" charset="-127"/>
+                <a:ea typeface="나눔고딕" pitchFamily="50" charset="-127"/>
+              </a:endParaRPr>
+            </a:p>
+          </p:txBody>
+        </p:sp>
+      </p:grpSp>
+      <p:cxnSp>
+        <p:nvCxnSpPr>
+          <p:cNvPr id="178" name="직선 화살표 연결선 177"/>
+          <p:cNvCxnSpPr/>
+          <p:nvPr/>
+        </p:nvCxnSpPr>
+        <p:spPr>
+          <a:xfrm>
+            <a:off x="2760454" y="4514053"/>
+            <a:ext cx="1243749" cy="0"/>
+          </a:xfrm>
+          <a:prstGeom prst="straightConnector1">
+            <a:avLst/>
+          </a:prstGeom>
+          <a:ln w="31750">
+            <a:solidFill>
+              <a:schemeClr val="tx1"/>
+            </a:solidFill>
+            <a:tailEnd type="triangle"/>
+          </a:ln>
+        </p:spPr>
+        <p:style>
+          <a:lnRef idx="1">
+            <a:schemeClr val="accent1"/>
+          </a:lnRef>
+          <a:fillRef idx="0">
+            <a:schemeClr val="accent1"/>
+          </a:fillRef>
+          <a:effectRef idx="0">
+            <a:schemeClr val="accent1"/>
+          </a:effectRef>
+          <a:fontRef idx="minor">
+            <a:schemeClr val="tx1"/>
+          </a:fontRef>
+        </p:style>
+      </p:cxnSp>
+      <p:grpSp>
+        <p:nvGrpSpPr>
+          <p:cNvPr id="179" name="그룹 178"/>
+          <p:cNvGrpSpPr/>
+          <p:nvPr/>
+        </p:nvGrpSpPr>
+        <p:grpSpPr>
+          <a:xfrm>
+            <a:off x="357187" y="5111447"/>
+            <a:ext cx="2320653" cy="246221"/>
+            <a:chOff x="1209970" y="3940204"/>
+            <a:chExt cx="2281790" cy="246221"/>
+          </a:xfrm>
+        </p:grpSpPr>
+        <p:sp>
+          <p:nvSpPr>
+            <p:cNvPr id="180" name="TextBox 43"/>
+            <p:cNvSpPr txBox="1"/>
+            <p:nvPr/>
+          </p:nvSpPr>
+          <p:spPr>
+            <a:xfrm>
+              <a:off x="3066337" y="3940204"/>
+              <a:ext cx="425423" cy="246221"/>
+            </a:xfrm>
+            <a:prstGeom prst="rect">
+              <a:avLst/>
+            </a:prstGeom>
+            <a:solidFill>
+              <a:schemeClr val="bg2">
+                <a:lumMod val="10000"/>
+                <a:alpha val="36078"/>
+              </a:schemeClr>
+            </a:solidFill>
+          </p:spPr>
+          <p:txBody>
+            <a:bodyPr wrap="square" rtlCol="0">
+              <a:spAutoFit/>
+            </a:bodyPr>
+            <a:lstStyle>
+              <a:defPPr>
+                <a:defRPr lang="ko-KR"/>
+              </a:defPPr>
+              <a:lvl1pPr marL="0" algn="l" defTabSz="914400" rtl="0" eaLnBrk="1" latinLnBrk="1" hangingPunct="1">
+                <a:defRPr sz="1800" kern="1200">
+                  <a:solidFill>
+                    <a:schemeClr val="tx1"/>
+                  </a:solidFill>
+                  <a:latin typeface="+mn-lt"/>
+                  <a:ea typeface="+mn-ea"/>
+                  <a:cs typeface="+mn-cs"/>
+                </a:defRPr>
+              </a:lvl1pPr>
+              <a:lvl2pPr marL="457200" algn="l" defTabSz="914400" rtl="0" eaLnBrk="1" latinLnBrk="1" hangingPunct="1">
+                <a:defRPr sz="1800" kern="1200">
+                  <a:solidFill>
+                    <a:schemeClr val="tx1"/>
+                  </a:solidFill>
+                  <a:latin typeface="+mn-lt"/>
+                  <a:ea typeface="+mn-ea"/>
+                  <a:cs typeface="+mn-cs"/>
+                </a:defRPr>
+              </a:lvl2pPr>
+              <a:lvl3pPr marL="914400" algn="l" defTabSz="914400" rtl="0" eaLnBrk="1" latinLnBrk="1" hangingPunct="1">
+                <a:defRPr sz="1800" kern="1200">
+                  <a:solidFill>
+                    <a:schemeClr val="tx1"/>
+                  </a:solidFill>
+                  <a:latin typeface="+mn-lt"/>
+                  <a:ea typeface="+mn-ea"/>
+                  <a:cs typeface="+mn-cs"/>
+                </a:defRPr>
+              </a:lvl3pPr>
+              <a:lvl4pPr marL="1371600" algn="l" defTabSz="914400" rtl="0" eaLnBrk="1" latinLnBrk="1" hangingPunct="1">
+                <a:defRPr sz="1800" kern="1200">
+                  <a:solidFill>
+                    <a:schemeClr val="tx1"/>
+                  </a:solidFill>
+                  <a:latin typeface="+mn-lt"/>
+                  <a:ea typeface="+mn-ea"/>
+                  <a:cs typeface="+mn-cs"/>
+                </a:defRPr>
+              </a:lvl4pPr>
+              <a:lvl5pPr marL="1828800" algn="l" defTabSz="914400" rtl="0" eaLnBrk="1" latinLnBrk="1" hangingPunct="1">
+                <a:defRPr sz="1800" kern="1200">
+                  <a:solidFill>
+                    <a:schemeClr val="tx1"/>
+                  </a:solidFill>
+                  <a:latin typeface="+mn-lt"/>
+                  <a:ea typeface="+mn-ea"/>
+                  <a:cs typeface="+mn-cs"/>
+                </a:defRPr>
+              </a:lvl5pPr>
+              <a:lvl6pPr marL="2286000" algn="l" defTabSz="914400" rtl="0" eaLnBrk="1" latinLnBrk="1" hangingPunct="1">
+                <a:defRPr sz="1800" kern="1200">
+                  <a:solidFill>
+                    <a:schemeClr val="tx1"/>
+                  </a:solidFill>
+                  <a:latin typeface="+mn-lt"/>
+                  <a:ea typeface="+mn-ea"/>
+                  <a:cs typeface="+mn-cs"/>
+                </a:defRPr>
+              </a:lvl6pPr>
+              <a:lvl7pPr marL="2743200" algn="l" defTabSz="914400" rtl="0" eaLnBrk="1" latinLnBrk="1" hangingPunct="1">
+                <a:defRPr sz="1800" kern="1200">
+                  <a:solidFill>
+                    <a:schemeClr val="tx1"/>
+                  </a:solidFill>
+                  <a:latin typeface="+mn-lt"/>
+                  <a:ea typeface="+mn-ea"/>
+                  <a:cs typeface="+mn-cs"/>
+                </a:defRPr>
+              </a:lvl7pPr>
+              <a:lvl8pPr marL="3200400" algn="l" defTabSz="914400" rtl="0" eaLnBrk="1" latinLnBrk="1" hangingPunct="1">
+                <a:defRPr sz="1800" kern="1200">
+                  <a:solidFill>
+                    <a:schemeClr val="tx1"/>
+                  </a:solidFill>
+                  <a:latin typeface="+mn-lt"/>
+                  <a:ea typeface="+mn-ea"/>
+                  <a:cs typeface="+mn-cs"/>
+                </a:defRPr>
+              </a:lvl8pPr>
+              <a:lvl9pPr marL="3657600" algn="l" defTabSz="914400" rtl="0" eaLnBrk="1" latinLnBrk="1" hangingPunct="1">
+                <a:defRPr sz="1800" kern="1200">
+                  <a:solidFill>
+                    <a:schemeClr val="tx1"/>
+                  </a:solidFill>
+                  <a:latin typeface="+mn-lt"/>
+                  <a:ea typeface="+mn-ea"/>
+                  <a:cs typeface="+mn-cs"/>
+                </a:defRPr>
+              </a:lvl9pPr>
+            </a:lstStyle>
+            <a:p>
+              <a:pPr marL="177800" indent="-177800" algn="ctr"/>
+              <a:r>
+                <a:rPr lang="en-US" altLang="ko-KR" sz="1000" b="1" dirty="0">
+                  <a:latin typeface="나눔고딕" pitchFamily="50" charset="-127"/>
+                  <a:ea typeface="나눔고딕" pitchFamily="50" charset="-127"/>
+                </a:rPr>
+                <a:t>151</a:t>
+              </a:r>
+              <a:endParaRPr lang="en-US" altLang="ko-KR" sz="1000" dirty="0">
+                <a:latin typeface="나눔고딕" pitchFamily="50" charset="-127"/>
+                <a:ea typeface="나눔고딕" pitchFamily="50" charset="-127"/>
+              </a:endParaRPr>
+            </a:p>
+          </p:txBody>
+        </p:sp>
+        <p:sp>
+          <p:nvSpPr>
+            <p:cNvPr id="181" name="TextBox 52"/>
+            <p:cNvSpPr txBox="1"/>
+            <p:nvPr/>
+          </p:nvSpPr>
+          <p:spPr>
+            <a:xfrm>
+              <a:off x="1209970" y="3970981"/>
+              <a:ext cx="1850318" cy="215444"/>
+            </a:xfrm>
+            <a:prstGeom prst="rect">
+              <a:avLst/>
+            </a:prstGeom>
+            <a:noFill/>
+          </p:spPr>
+          <p:txBody>
+            <a:bodyPr wrap="square" rtlCol="0" anchor="b">
+              <a:spAutoFit/>
+            </a:bodyPr>
+            <a:lstStyle>
+              <a:defPPr>
+                <a:defRPr lang="ko-KR"/>
+              </a:defPPr>
+              <a:lvl1pPr marL="0" algn="l" defTabSz="914400" rtl="0" eaLnBrk="1" latinLnBrk="1" hangingPunct="1">
+                <a:defRPr sz="1800" kern="1200">
+                  <a:solidFill>
+                    <a:schemeClr val="tx1"/>
+                  </a:solidFill>
+                  <a:latin typeface="+mn-lt"/>
+                  <a:ea typeface="+mn-ea"/>
+                  <a:cs typeface="+mn-cs"/>
+                </a:defRPr>
+              </a:lvl1pPr>
+              <a:lvl2pPr marL="457200" algn="l" defTabSz="914400" rtl="0" eaLnBrk="1" latinLnBrk="1" hangingPunct="1">
+                <a:defRPr sz="1800" kern="1200">
+                  <a:solidFill>
+                    <a:schemeClr val="tx1"/>
+                  </a:solidFill>
+                  <a:latin typeface="+mn-lt"/>
+                  <a:ea typeface="+mn-ea"/>
+                  <a:cs typeface="+mn-cs"/>
+                </a:defRPr>
+              </a:lvl2pPr>
+              <a:lvl3pPr marL="914400" algn="l" defTabSz="914400" rtl="0" eaLnBrk="1" latinLnBrk="1" hangingPunct="1">
+                <a:defRPr sz="1800" kern="1200">
+                  <a:solidFill>
+                    <a:schemeClr val="tx1"/>
+                  </a:solidFill>
+                  <a:latin typeface="+mn-lt"/>
+                  <a:ea typeface="+mn-ea"/>
+                  <a:cs typeface="+mn-cs"/>
+                </a:defRPr>
+              </a:lvl3pPr>
+              <a:lvl4pPr marL="1371600" algn="l" defTabSz="914400" rtl="0" eaLnBrk="1" latinLnBrk="1" hangingPunct="1">
+                <a:defRPr sz="1800" kern="1200">
+                  <a:solidFill>
+                    <a:schemeClr val="tx1"/>
+                  </a:solidFill>
+                  <a:latin typeface="+mn-lt"/>
+                  <a:ea typeface="+mn-ea"/>
+                  <a:cs typeface="+mn-cs"/>
+                </a:defRPr>
+              </a:lvl4pPr>
+              <a:lvl5pPr marL="1828800" algn="l" defTabSz="914400" rtl="0" eaLnBrk="1" latinLnBrk="1" hangingPunct="1">
+                <a:defRPr sz="1800" kern="1200">
+                  <a:solidFill>
+                    <a:schemeClr val="tx1"/>
+                  </a:solidFill>
+                  <a:latin typeface="+mn-lt"/>
+                  <a:ea typeface="+mn-ea"/>
+                  <a:cs typeface="+mn-cs"/>
+                </a:defRPr>
+              </a:lvl5pPr>
+              <a:lvl6pPr marL="2286000" algn="l" defTabSz="914400" rtl="0" eaLnBrk="1" latinLnBrk="1" hangingPunct="1">
+                <a:defRPr sz="1800" kern="1200">
+                  <a:solidFill>
+                    <a:schemeClr val="tx1"/>
+                  </a:solidFill>
+                  <a:latin typeface="+mn-lt"/>
+                  <a:ea typeface="+mn-ea"/>
+                  <a:cs typeface="+mn-cs"/>
+                </a:defRPr>
+              </a:lvl6pPr>
+              <a:lvl7pPr marL="2743200" algn="l" defTabSz="914400" rtl="0" eaLnBrk="1" latinLnBrk="1" hangingPunct="1">
+                <a:defRPr sz="1800" kern="1200">
+                  <a:solidFill>
+                    <a:schemeClr val="tx1"/>
+                  </a:solidFill>
+                  <a:latin typeface="+mn-lt"/>
+                  <a:ea typeface="+mn-ea"/>
+                  <a:cs typeface="+mn-cs"/>
+                </a:defRPr>
+              </a:lvl7pPr>
+              <a:lvl8pPr marL="3200400" algn="l" defTabSz="914400" rtl="0" eaLnBrk="1" latinLnBrk="1" hangingPunct="1">
+                <a:defRPr sz="1800" kern="1200">
+                  <a:solidFill>
+                    <a:schemeClr val="tx1"/>
+                  </a:solidFill>
+                  <a:latin typeface="+mn-lt"/>
+                  <a:ea typeface="+mn-ea"/>
+                  <a:cs typeface="+mn-cs"/>
+                </a:defRPr>
+              </a:lvl8pPr>
+              <a:lvl9pPr marL="3657600" algn="l" defTabSz="914400" rtl="0" eaLnBrk="1" latinLnBrk="1" hangingPunct="1">
+                <a:defRPr sz="1800" kern="1200">
+                  <a:solidFill>
+                    <a:schemeClr val="tx1"/>
+                  </a:solidFill>
+                  <a:latin typeface="+mn-lt"/>
+                  <a:ea typeface="+mn-ea"/>
+                  <a:cs typeface="+mn-cs"/>
+                </a:defRPr>
+              </a:lvl9pPr>
+            </a:lstStyle>
+            <a:p>
+              <a:pPr marL="177800" indent="-177800" algn="r">
+                <a:lnSpc>
+                  <a:spcPct val="80000"/>
+                </a:lnSpc>
+              </a:pPr>
+              <a:r>
+                <a:rPr lang="en-US" altLang="ko-KR" sz="1000" b="1" spc="-20" dirty="0">
+                  <a:latin typeface="나눔고딕" pitchFamily="50" charset="-127"/>
+                  <a:ea typeface="나눔고딕" pitchFamily="50" charset="-127"/>
+                </a:rPr>
+                <a:t>request PHONESTATE info</a:t>
+              </a:r>
+              <a:endParaRPr lang="en-US" altLang="ko-KR" sz="1000" spc="-20" dirty="0">
+                <a:latin typeface="나눔고딕" pitchFamily="50" charset="-127"/>
+                <a:ea typeface="나눔고딕" pitchFamily="50" charset="-127"/>
+              </a:endParaRPr>
+            </a:p>
+          </p:txBody>
+        </p:sp>
+      </p:grpSp>
+      <p:cxnSp>
+        <p:nvCxnSpPr>
+          <p:cNvPr id="182" name="직선 화살표 연결선 181"/>
+          <p:cNvCxnSpPr/>
+          <p:nvPr/>
+        </p:nvCxnSpPr>
+        <p:spPr>
+          <a:xfrm>
+            <a:off x="2760454" y="5146249"/>
+            <a:ext cx="1243749" cy="0"/>
+          </a:xfrm>
+          <a:prstGeom prst="straightConnector1">
+            <a:avLst/>
+          </a:prstGeom>
+          <a:ln w="31750">
+            <a:solidFill>
+              <a:schemeClr val="tx1"/>
+            </a:solidFill>
+            <a:tailEnd type="triangle"/>
+          </a:ln>
+        </p:spPr>
+        <p:style>
+          <a:lnRef idx="1">
+            <a:schemeClr val="accent1"/>
+          </a:lnRef>
+          <a:fillRef idx="0">
+            <a:schemeClr val="accent1"/>
+          </a:fillRef>
+          <a:effectRef idx="0">
+            <a:schemeClr val="accent1"/>
+          </a:effectRef>
+          <a:fontRef idx="minor">
+            <a:schemeClr val="tx1"/>
+          </a:fontRef>
+        </p:style>
+      </p:cxnSp>
+      <p:grpSp>
+        <p:nvGrpSpPr>
+          <p:cNvPr id="28" name="그룹 27"/>
+          <p:cNvGrpSpPr/>
+          <p:nvPr/>
+        </p:nvGrpSpPr>
+        <p:grpSpPr>
+          <a:xfrm>
+            <a:off x="5482828" y="5441646"/>
+            <a:ext cx="1226344" cy="677641"/>
+            <a:chOff x="714375" y="1405715"/>
+            <a:chExt cx="1226344" cy="677641"/>
+          </a:xfrm>
+        </p:grpSpPr>
+        <p:sp>
+          <p:nvSpPr>
+            <p:cNvPr id="27" name="직사각형 26"/>
+            <p:cNvSpPr/>
+            <p:nvPr/>
+          </p:nvSpPr>
+          <p:spPr>
+            <a:xfrm>
+              <a:off x="714375" y="1405715"/>
+              <a:ext cx="1226344" cy="676727"/>
+            </a:xfrm>
+            <a:prstGeom prst="rect">
+              <a:avLst/>
+            </a:prstGeom>
+            <a:solidFill>
+              <a:srgbClr val="FF0000"/>
+            </a:solidFill>
+            <a:ln>
+              <a:noFill/>
+            </a:ln>
+          </p:spPr>
+          <p:style>
+            <a:lnRef idx="2">
+              <a:schemeClr val="accent2">
+                <a:shade val="50000"/>
+              </a:schemeClr>
+            </a:lnRef>
+            <a:fillRef idx="1">
+              <a:schemeClr val="accent2"/>
+            </a:fillRef>
+            <a:effectRef idx="0">
+              <a:schemeClr val="accent2"/>
+            </a:effectRef>
+            <a:fontRef idx="minor">
+              <a:schemeClr val="lt1"/>
+            </a:fontRef>
+          </p:style>
+          <p:txBody>
+            <a:bodyPr rtlCol="0" anchor="ctr"/>
+            <a:lstStyle/>
+            <a:p>
+              <a:pPr algn="ctr"/>
+              <a:endParaRPr lang="ko-KR" altLang="en-US"/>
+            </a:p>
+          </p:txBody>
+        </p:sp>
+        <p:grpSp>
+          <p:nvGrpSpPr>
+            <p:cNvPr id="23" name="그룹 22"/>
+            <p:cNvGrpSpPr/>
+            <p:nvPr/>
+          </p:nvGrpSpPr>
+          <p:grpSpPr>
+            <a:xfrm>
+              <a:off x="732347" y="1462683"/>
+              <a:ext cx="1190632" cy="620673"/>
+              <a:chOff x="5600607" y="5658349"/>
+              <a:chExt cx="1190632" cy="620673"/>
+            </a:xfrm>
+          </p:grpSpPr>
+          <p:sp>
+            <p:nvSpPr>
+              <p:cNvPr id="189" name="TextBox 43"/>
+              <p:cNvSpPr txBox="1"/>
+              <p:nvPr/>
+            </p:nvSpPr>
+            <p:spPr>
+              <a:xfrm>
+                <a:off x="5927693" y="5658349"/>
+                <a:ext cx="425423" cy="246221"/>
+              </a:xfrm>
+              <a:prstGeom prst="rect">
+                <a:avLst/>
+              </a:prstGeom>
+              <a:solidFill>
+                <a:schemeClr val="bg2">
+                  <a:lumMod val="10000"/>
+                  <a:alpha val="36078"/>
+                </a:schemeClr>
+              </a:solidFill>
+            </p:spPr>
+            <p:txBody>
+              <a:bodyPr wrap="square" rtlCol="0">
+                <a:spAutoFit/>
+              </a:bodyPr>
+              <a:lstStyle>
+                <a:defPPr>
+                  <a:defRPr lang="ko-KR"/>
+                </a:defPPr>
+                <a:lvl1pPr marL="0" algn="l" defTabSz="914400" rtl="0" eaLnBrk="1" latinLnBrk="1" hangingPunct="1">
+                  <a:defRPr sz="1800" kern="1200">
+                    <a:solidFill>
+                      <a:schemeClr val="tx1"/>
+                    </a:solidFill>
+                    <a:latin typeface="+mn-lt"/>
+                    <a:ea typeface="+mn-ea"/>
+                    <a:cs typeface="+mn-cs"/>
+                  </a:defRPr>
+                </a:lvl1pPr>
+                <a:lvl2pPr marL="457200" algn="l" defTabSz="914400" rtl="0" eaLnBrk="1" latinLnBrk="1" hangingPunct="1">
+                  <a:defRPr sz="1800" kern="1200">
+                    <a:solidFill>
+                      <a:schemeClr val="tx1"/>
+                    </a:solidFill>
+                    <a:latin typeface="+mn-lt"/>
+                    <a:ea typeface="+mn-ea"/>
+                    <a:cs typeface="+mn-cs"/>
+                  </a:defRPr>
+                </a:lvl2pPr>
+                <a:lvl3pPr marL="914400" algn="l" defTabSz="914400" rtl="0" eaLnBrk="1" latinLnBrk="1" hangingPunct="1">
+                  <a:defRPr sz="1800" kern="1200">
+                    <a:solidFill>
+                      <a:schemeClr val="tx1"/>
+                    </a:solidFill>
+                    <a:latin typeface="+mn-lt"/>
+                    <a:ea typeface="+mn-ea"/>
+                    <a:cs typeface="+mn-cs"/>
+                  </a:defRPr>
+                </a:lvl3pPr>
+                <a:lvl4pPr marL="1371600" algn="l" defTabSz="914400" rtl="0" eaLnBrk="1" latinLnBrk="1" hangingPunct="1">
+                  <a:defRPr sz="1800" kern="1200">
+                    <a:solidFill>
+                      <a:schemeClr val="tx1"/>
+                    </a:solidFill>
+                    <a:latin typeface="+mn-lt"/>
+                    <a:ea typeface="+mn-ea"/>
+                    <a:cs typeface="+mn-cs"/>
+                  </a:defRPr>
+                </a:lvl4pPr>
+                <a:lvl5pPr marL="1828800" algn="l" defTabSz="914400" rtl="0" eaLnBrk="1" latinLnBrk="1" hangingPunct="1">
+                  <a:defRPr sz="1800" kern="1200">
+                    <a:solidFill>
+                      <a:schemeClr val="tx1"/>
+                    </a:solidFill>
+                    <a:latin typeface="+mn-lt"/>
+                    <a:ea typeface="+mn-ea"/>
+                    <a:cs typeface="+mn-cs"/>
+                  </a:defRPr>
+                </a:lvl5pPr>
+                <a:lvl6pPr marL="2286000" algn="l" defTabSz="914400" rtl="0" eaLnBrk="1" latinLnBrk="1" hangingPunct="1">
+                  <a:defRPr sz="1800" kern="1200">
+                    <a:solidFill>
+                      <a:schemeClr val="tx1"/>
+                    </a:solidFill>
+                    <a:latin typeface="+mn-lt"/>
+                    <a:ea typeface="+mn-ea"/>
+                    <a:cs typeface="+mn-cs"/>
+                  </a:defRPr>
+                </a:lvl6pPr>
+                <a:lvl7pPr marL="2743200" algn="l" defTabSz="914400" rtl="0" eaLnBrk="1" latinLnBrk="1" hangingPunct="1">
+                  <a:defRPr sz="1800" kern="1200">
+                    <a:solidFill>
+                      <a:schemeClr val="tx1"/>
+                    </a:solidFill>
+                    <a:latin typeface="+mn-lt"/>
+                    <a:ea typeface="+mn-ea"/>
+                    <a:cs typeface="+mn-cs"/>
+                  </a:defRPr>
+                </a:lvl7pPr>
+                <a:lvl8pPr marL="3200400" algn="l" defTabSz="914400" rtl="0" eaLnBrk="1" latinLnBrk="1" hangingPunct="1">
+                  <a:defRPr sz="1800" kern="1200">
+                    <a:solidFill>
+                      <a:schemeClr val="tx1"/>
+                    </a:solidFill>
+                    <a:latin typeface="+mn-lt"/>
+                    <a:ea typeface="+mn-ea"/>
+                    <a:cs typeface="+mn-cs"/>
+                  </a:defRPr>
+                </a:lvl8pPr>
+                <a:lvl9pPr marL="3657600" algn="l" defTabSz="914400" rtl="0" eaLnBrk="1" latinLnBrk="1" hangingPunct="1">
+                  <a:defRPr sz="1800" kern="1200">
+                    <a:solidFill>
+                      <a:schemeClr val="tx1"/>
+                    </a:solidFill>
+                    <a:latin typeface="+mn-lt"/>
+                    <a:ea typeface="+mn-ea"/>
+                    <a:cs typeface="+mn-cs"/>
+                  </a:defRPr>
+                </a:lvl9pPr>
+              </a:lstStyle>
+              <a:p>
+                <a:pPr marL="177800" indent="-177800" algn="ctr"/>
+                <a:r>
+                  <a:rPr lang="en-US" altLang="ko-KR" sz="1000" b="1" dirty="0">
+                    <a:latin typeface="나눔고딕" pitchFamily="50" charset="-127"/>
+                    <a:ea typeface="나눔고딕" pitchFamily="50" charset="-127"/>
+                  </a:rPr>
+                  <a:t>999</a:t>
+                </a:r>
+                <a:endParaRPr lang="en-US" altLang="ko-KR" sz="1000" dirty="0">
+                  <a:latin typeface="나눔고딕" pitchFamily="50" charset="-127"/>
+                  <a:ea typeface="나눔고딕" pitchFamily="50" charset="-127"/>
+                </a:endParaRPr>
+              </a:p>
+            </p:txBody>
+          </p:sp>
+          <p:sp>
+            <p:nvSpPr>
+              <p:cNvPr id="190" name="TextBox 52"/>
+              <p:cNvSpPr txBox="1"/>
+              <p:nvPr/>
+            </p:nvSpPr>
+            <p:spPr>
+              <a:xfrm>
+                <a:off x="5600607" y="5940468"/>
+                <a:ext cx="1079596" cy="338554"/>
+              </a:xfrm>
+              <a:prstGeom prst="rect">
+                <a:avLst/>
+              </a:prstGeom>
+              <a:noFill/>
+            </p:spPr>
+            <p:txBody>
+              <a:bodyPr wrap="square" rtlCol="0" anchor="b">
+                <a:spAutoFit/>
+              </a:bodyPr>
+              <a:lstStyle>
+                <a:defPPr>
+                  <a:defRPr lang="ko-KR"/>
+                </a:defPPr>
+                <a:lvl1pPr marL="0" algn="l" defTabSz="914400" rtl="0" eaLnBrk="1" latinLnBrk="1" hangingPunct="1">
+                  <a:defRPr sz="1800" kern="1200">
+                    <a:solidFill>
+                      <a:schemeClr val="tx1"/>
+                    </a:solidFill>
+                    <a:latin typeface="+mn-lt"/>
+                    <a:ea typeface="+mn-ea"/>
+                    <a:cs typeface="+mn-cs"/>
+                  </a:defRPr>
+                </a:lvl1pPr>
+                <a:lvl2pPr marL="457200" algn="l" defTabSz="914400" rtl="0" eaLnBrk="1" latinLnBrk="1" hangingPunct="1">
+                  <a:defRPr sz="1800" kern="1200">
+                    <a:solidFill>
+                      <a:schemeClr val="tx1"/>
+                    </a:solidFill>
+                    <a:latin typeface="+mn-lt"/>
+                    <a:ea typeface="+mn-ea"/>
+                    <a:cs typeface="+mn-cs"/>
+                  </a:defRPr>
+                </a:lvl2pPr>
+                <a:lvl3pPr marL="914400" algn="l" defTabSz="914400" rtl="0" eaLnBrk="1" latinLnBrk="1" hangingPunct="1">
+                  <a:defRPr sz="1800" kern="1200">
+                    <a:solidFill>
+                      <a:schemeClr val="tx1"/>
+                    </a:solidFill>
+                    <a:latin typeface="+mn-lt"/>
+                    <a:ea typeface="+mn-ea"/>
+                    <a:cs typeface="+mn-cs"/>
+                  </a:defRPr>
+                </a:lvl3pPr>
+                <a:lvl4pPr marL="1371600" algn="l" defTabSz="914400" rtl="0" eaLnBrk="1" latinLnBrk="1" hangingPunct="1">
+                  <a:defRPr sz="1800" kern="1200">
+                    <a:solidFill>
+                      <a:schemeClr val="tx1"/>
+                    </a:solidFill>
+                    <a:latin typeface="+mn-lt"/>
+                    <a:ea typeface="+mn-ea"/>
+                    <a:cs typeface="+mn-cs"/>
+                  </a:defRPr>
+                </a:lvl4pPr>
+                <a:lvl5pPr marL="1828800" algn="l" defTabSz="914400" rtl="0" eaLnBrk="1" latinLnBrk="1" hangingPunct="1">
+                  <a:defRPr sz="1800" kern="1200">
+                    <a:solidFill>
+                      <a:schemeClr val="tx1"/>
+                    </a:solidFill>
+                    <a:latin typeface="+mn-lt"/>
+                    <a:ea typeface="+mn-ea"/>
+                    <a:cs typeface="+mn-cs"/>
+                  </a:defRPr>
+                </a:lvl5pPr>
+                <a:lvl6pPr marL="2286000" algn="l" defTabSz="914400" rtl="0" eaLnBrk="1" latinLnBrk="1" hangingPunct="1">
+                  <a:defRPr sz="1800" kern="1200">
+                    <a:solidFill>
+                      <a:schemeClr val="tx1"/>
+                    </a:solidFill>
+                    <a:latin typeface="+mn-lt"/>
+                    <a:ea typeface="+mn-ea"/>
+                    <a:cs typeface="+mn-cs"/>
+                  </a:defRPr>
+                </a:lvl6pPr>
+                <a:lvl7pPr marL="2743200" algn="l" defTabSz="914400" rtl="0" eaLnBrk="1" latinLnBrk="1" hangingPunct="1">
+                  <a:defRPr sz="1800" kern="1200">
+                    <a:solidFill>
+                      <a:schemeClr val="tx1"/>
+                    </a:solidFill>
+                    <a:latin typeface="+mn-lt"/>
+                    <a:ea typeface="+mn-ea"/>
+                    <a:cs typeface="+mn-cs"/>
+                  </a:defRPr>
+                </a:lvl7pPr>
+                <a:lvl8pPr marL="3200400" algn="l" defTabSz="914400" rtl="0" eaLnBrk="1" latinLnBrk="1" hangingPunct="1">
+                  <a:defRPr sz="1800" kern="1200">
+                    <a:solidFill>
+                      <a:schemeClr val="tx1"/>
+                    </a:solidFill>
+                    <a:latin typeface="+mn-lt"/>
+                    <a:ea typeface="+mn-ea"/>
+                    <a:cs typeface="+mn-cs"/>
+                  </a:defRPr>
+                </a:lvl8pPr>
+                <a:lvl9pPr marL="3657600" algn="l" defTabSz="914400" rtl="0" eaLnBrk="1" latinLnBrk="1" hangingPunct="1">
+                  <a:defRPr sz="1800" kern="1200">
+                    <a:solidFill>
+                      <a:schemeClr val="tx1"/>
+                    </a:solidFill>
+                    <a:latin typeface="+mn-lt"/>
+                    <a:ea typeface="+mn-ea"/>
+                    <a:cs typeface="+mn-cs"/>
+                  </a:defRPr>
+                </a:lvl9pPr>
+              </a:lstStyle>
+              <a:p>
+                <a:pPr marL="177800" indent="-177800" algn="ctr">
+                  <a:lnSpc>
+                    <a:spcPct val="80000"/>
+                  </a:lnSpc>
+                </a:pPr>
+                <a:r>
+                  <a:rPr lang="en-US" altLang="ko-KR" sz="1000" b="1" spc="-20" dirty="0">
+                    <a:latin typeface="나눔고딕" pitchFamily="50" charset="-127"/>
+                    <a:ea typeface="나눔고딕" pitchFamily="50" charset="-127"/>
+                  </a:rPr>
+                  <a:t>failed!!</a:t>
+                </a:r>
+              </a:p>
+              <a:p>
+                <a:pPr marL="177800" indent="-177800" algn="ctr">
+                  <a:lnSpc>
+                    <a:spcPct val="80000"/>
+                  </a:lnSpc>
+                </a:pPr>
+                <a:r>
+                  <a:rPr lang="en-US" altLang="ko-KR" sz="1000" b="1" spc="-20" dirty="0" err="1">
+                    <a:latin typeface="나눔고딕" pitchFamily="50" charset="-127"/>
+                    <a:ea typeface="나눔고딕" pitchFamily="50" charset="-127"/>
+                  </a:rPr>
+                  <a:t>gonna</a:t>
+                </a:r>
+                <a:r>
+                  <a:rPr lang="en-US" altLang="ko-KR" sz="1000" b="1" spc="-20" dirty="0">
+                    <a:latin typeface="나눔고딕" pitchFamily="50" charset="-127"/>
+                    <a:ea typeface="나눔고딕" pitchFamily="50" charset="-127"/>
+                  </a:rPr>
+                  <a:t> resend</a:t>
+                </a:r>
+                <a:endParaRPr lang="en-US" altLang="ko-KR" sz="1000" spc="-20" dirty="0">
+                  <a:latin typeface="나눔고딕" pitchFamily="50" charset="-127"/>
+                  <a:ea typeface="나눔고딕" pitchFamily="50" charset="-127"/>
+                </a:endParaRPr>
+              </a:p>
+            </p:txBody>
+          </p:sp>
+          <p:sp>
+            <p:nvSpPr>
+              <p:cNvPr id="194" name="TextBox 52"/>
+              <p:cNvSpPr txBox="1"/>
+              <p:nvPr/>
+            </p:nvSpPr>
+            <p:spPr>
+              <a:xfrm>
+                <a:off x="6285073" y="5750862"/>
+                <a:ext cx="506166" cy="190821"/>
+              </a:xfrm>
+              <a:prstGeom prst="rect">
+                <a:avLst/>
+              </a:prstGeom>
+              <a:noFill/>
+            </p:spPr>
+            <p:txBody>
+              <a:bodyPr wrap="square" rtlCol="0">
+                <a:spAutoFit/>
+              </a:bodyPr>
+              <a:lstStyle>
+                <a:defPPr>
+                  <a:defRPr lang="ko-KR"/>
+                </a:defPPr>
+                <a:lvl1pPr marL="0" algn="l" defTabSz="914400" rtl="0" eaLnBrk="1" latinLnBrk="1" hangingPunct="1">
+                  <a:defRPr sz="1800" kern="1200">
+                    <a:solidFill>
+                      <a:schemeClr val="tx1"/>
+                    </a:solidFill>
+                    <a:latin typeface="+mn-lt"/>
+                    <a:ea typeface="+mn-ea"/>
+                    <a:cs typeface="+mn-cs"/>
+                  </a:defRPr>
+                </a:lvl1pPr>
+                <a:lvl2pPr marL="457200" algn="l" defTabSz="914400" rtl="0" eaLnBrk="1" latinLnBrk="1" hangingPunct="1">
+                  <a:defRPr sz="1800" kern="1200">
+                    <a:solidFill>
+                      <a:schemeClr val="tx1"/>
+                    </a:solidFill>
+                    <a:latin typeface="+mn-lt"/>
+                    <a:ea typeface="+mn-ea"/>
+                    <a:cs typeface="+mn-cs"/>
+                  </a:defRPr>
+                </a:lvl2pPr>
+                <a:lvl3pPr marL="914400" algn="l" defTabSz="914400" rtl="0" eaLnBrk="1" latinLnBrk="1" hangingPunct="1">
+                  <a:defRPr sz="1800" kern="1200">
+                    <a:solidFill>
+                      <a:schemeClr val="tx1"/>
+                    </a:solidFill>
+                    <a:latin typeface="+mn-lt"/>
+                    <a:ea typeface="+mn-ea"/>
+                    <a:cs typeface="+mn-cs"/>
+                  </a:defRPr>
+                </a:lvl3pPr>
+                <a:lvl4pPr marL="1371600" algn="l" defTabSz="914400" rtl="0" eaLnBrk="1" latinLnBrk="1" hangingPunct="1">
+                  <a:defRPr sz="1800" kern="1200">
+                    <a:solidFill>
+                      <a:schemeClr val="tx1"/>
+                    </a:solidFill>
+                    <a:latin typeface="+mn-lt"/>
+                    <a:ea typeface="+mn-ea"/>
+                    <a:cs typeface="+mn-cs"/>
+                  </a:defRPr>
+                </a:lvl4pPr>
+                <a:lvl5pPr marL="1828800" algn="l" defTabSz="914400" rtl="0" eaLnBrk="1" latinLnBrk="1" hangingPunct="1">
+                  <a:defRPr sz="1800" kern="1200">
+                    <a:solidFill>
+                      <a:schemeClr val="tx1"/>
+                    </a:solidFill>
+                    <a:latin typeface="+mn-lt"/>
+                    <a:ea typeface="+mn-ea"/>
+                    <a:cs typeface="+mn-cs"/>
+                  </a:defRPr>
+                </a:lvl5pPr>
+                <a:lvl6pPr marL="2286000" algn="l" defTabSz="914400" rtl="0" eaLnBrk="1" latinLnBrk="1" hangingPunct="1">
+                  <a:defRPr sz="1800" kern="1200">
+                    <a:solidFill>
+                      <a:schemeClr val="tx1"/>
+                    </a:solidFill>
+                    <a:latin typeface="+mn-lt"/>
+                    <a:ea typeface="+mn-ea"/>
+                    <a:cs typeface="+mn-cs"/>
+                  </a:defRPr>
+                </a:lvl6pPr>
+                <a:lvl7pPr marL="2743200" algn="l" defTabSz="914400" rtl="0" eaLnBrk="1" latinLnBrk="1" hangingPunct="1">
+                  <a:defRPr sz="1800" kern="1200">
+                    <a:solidFill>
+                      <a:schemeClr val="tx1"/>
+                    </a:solidFill>
+                    <a:latin typeface="+mn-lt"/>
+                    <a:ea typeface="+mn-ea"/>
+                    <a:cs typeface="+mn-cs"/>
+                  </a:defRPr>
+                </a:lvl7pPr>
+                <a:lvl8pPr marL="3200400" algn="l" defTabSz="914400" rtl="0" eaLnBrk="1" latinLnBrk="1" hangingPunct="1">
+                  <a:defRPr sz="1800" kern="1200">
+                    <a:solidFill>
+                      <a:schemeClr val="tx1"/>
+                    </a:solidFill>
+                    <a:latin typeface="+mn-lt"/>
+                    <a:ea typeface="+mn-ea"/>
+                    <a:cs typeface="+mn-cs"/>
+                  </a:defRPr>
+                </a:lvl8pPr>
+                <a:lvl9pPr marL="3657600" algn="l" defTabSz="914400" rtl="0" eaLnBrk="1" latinLnBrk="1" hangingPunct="1">
+                  <a:defRPr sz="1800" kern="1200">
+                    <a:solidFill>
+                      <a:schemeClr val="tx1"/>
+                    </a:solidFill>
+                    <a:latin typeface="+mn-lt"/>
+                    <a:ea typeface="+mn-ea"/>
+                    <a:cs typeface="+mn-cs"/>
+                  </a:defRPr>
+                </a:lvl9pPr>
+              </a:lstStyle>
+              <a:p>
+                <a:pPr marL="177800" indent="-177800">
+                  <a:lnSpc>
+                    <a:spcPct val="80000"/>
+                  </a:lnSpc>
+                </a:pPr>
+                <a:r>
+                  <a:rPr lang="en-US" altLang="ko-KR" sz="800" b="1" spc="-20" dirty="0">
+                    <a:latin typeface="나눔고딕" pitchFamily="50" charset="-127"/>
+                    <a:ea typeface="나눔고딕" pitchFamily="50" charset="-127"/>
+                  </a:rPr>
+                  <a:t>+ code</a:t>
+                </a:r>
+                <a:endParaRPr lang="en-US" altLang="ko-KR" sz="800" dirty="0">
+                  <a:latin typeface="나눔고딕" pitchFamily="50" charset="-127"/>
+                  <a:ea typeface="나눔고딕" pitchFamily="50" charset="-127"/>
+                </a:endParaRPr>
+              </a:p>
+            </p:txBody>
+          </p:sp>
+        </p:grpSp>
+      </p:grpSp>
+      <p:sp>
+        <p:nvSpPr>
+          <p:cNvPr id="29" name="화살표: U자형 28"/>
+          <p:cNvSpPr/>
+          <p:nvPr/>
+        </p:nvSpPr>
+        <p:spPr>
+          <a:xfrm rot="5400000" flipV="1">
+            <a:off x="1079173" y="2950860"/>
+            <a:ext cx="1003236" cy="2191420"/>
+          </a:xfrm>
+          <a:prstGeom prst="uturnArrow">
+            <a:avLst>
+              <a:gd name="adj1" fmla="val 3089"/>
+              <a:gd name="adj2" fmla="val 25000"/>
+              <a:gd name="adj3" fmla="val 12419"/>
+              <a:gd name="adj4" fmla="val 30418"/>
+              <a:gd name="adj5" fmla="val 19611"/>
+            </a:avLst>
+          </a:prstGeom>
+          <a:solidFill>
+            <a:srgbClr val="AFABAB"/>
+          </a:solidFill>
+          <a:ln>
+            <a:noFill/>
+            <a:prstDash val="dash"/>
+          </a:ln>
+        </p:spPr>
+        <p:style>
+          <a:lnRef idx="2">
+            <a:schemeClr val="accent1">
+              <a:shade val="50000"/>
+            </a:schemeClr>
+          </a:lnRef>
+          <a:fillRef idx="1">
+            <a:schemeClr val="accent1"/>
+          </a:fillRef>
+          <a:effectRef idx="0">
+            <a:schemeClr val="accent1"/>
+          </a:effectRef>
+          <a:fontRef idx="minor">
+            <a:schemeClr val="lt1"/>
+          </a:fontRef>
+        </p:style>
+        <p:txBody>
+          <a:bodyPr rtlCol="0" anchor="ctr"/>
+          <a:lstStyle/>
+          <a:p>
+            <a:pPr algn="ctr"/>
+            <a:endParaRPr lang="ko-KR" altLang="en-US" dirty="0">
+              <a:solidFill>
+                <a:schemeClr val="tx1"/>
               </a:solidFill>
             </a:endParaRPr>
           </a:p>

</xml_diff>